<commit_message>
Tweaks to Oct 10 slides
</commit_message>
<xml_diff>
--- a/Slides/101018.pptx
+++ b/Slides/101018.pptx
@@ -737,10 +737,10 @@
           </a:ln>
           <a:extLst>
             <a:ext uri="{FAA26D3D-D897-4be2-8F04-BA451C77F1D7}">
-              <ma14:placeholderFlag xmlns:ma14="http://schemas.microsoft.com/office/mac/drawingml/2011/main" xmlns="" val="1"/>
+              <ma14:placeholderFlag xmlns="" xmlns:ma14="http://schemas.microsoft.com/office/mac/drawingml/2011/main" val="1"/>
             </a:ext>
             <a:ext uri="{909E8E84-426E-40dd-AFC4-6F175D3DCCD1}">
-              <a14:hiddenFill xmlns:a14="http://schemas.microsoft.com/office/drawing/2010/main" xmlns="">
+              <a14:hiddenFill xmlns="" xmlns:a14="http://schemas.microsoft.com/office/drawing/2010/main">
                 <a:solidFill>
                   <a:srgbClr val="FFFFFF"/>
                 </a:solidFill>
@@ -915,14 +915,14 @@
           <a:ln/>
           <a:extLst>
             <a:ext uri="{909E8E84-426E-40dd-AFC4-6F175D3DCCD1}">
-              <a14:hiddenFill xmlns:a14="http://schemas.microsoft.com/office/drawing/2010/main" xmlns="">
+              <a14:hiddenFill xmlns="" xmlns:a14="http://schemas.microsoft.com/office/drawing/2010/main">
                 <a:solidFill>
                   <a:srgbClr val="FFFFFF"/>
                 </a:solidFill>
               </a14:hiddenFill>
             </a:ext>
             <a:ext uri="{91240B29-F687-4f45-9708-019B960494DF}">
-              <a14:hiddenLine xmlns:a14="http://schemas.microsoft.com/office/drawing/2010/main" xmlns="" w="9525">
+              <a14:hiddenLine xmlns="" xmlns:a14="http://schemas.microsoft.com/office/drawing/2010/main" w="9525">
                 <a:solidFill>
                   <a:srgbClr val="000000"/>
                 </a:solidFill>
@@ -1090,17 +1090,17 @@
           <a:ln/>
           <a:extLst>
             <a:ext uri="{FAA26D3D-D897-4be2-8F04-BA451C77F1D7}">
-              <ma14:placeholderFlag xmlns:ma14="http://schemas.microsoft.com/office/mac/drawingml/2011/main" xmlns="" val="1"/>
+              <ma14:placeholderFlag xmlns="" xmlns:ma14="http://schemas.microsoft.com/office/mac/drawingml/2011/main" val="1"/>
             </a:ext>
             <a:ext uri="{909E8E84-426E-40dd-AFC4-6F175D3DCCD1}">
-              <a14:hiddenFill xmlns:a14="http://schemas.microsoft.com/office/drawing/2010/main" xmlns="">
+              <a14:hiddenFill xmlns="" xmlns:a14="http://schemas.microsoft.com/office/drawing/2010/main">
                 <a:solidFill>
                   <a:srgbClr val="FFFFFF"/>
                 </a:solidFill>
               </a14:hiddenFill>
             </a:ext>
             <a:ext uri="{91240B29-F687-4f45-9708-019B960494DF}">
-              <a14:hiddenLine xmlns:a14="http://schemas.microsoft.com/office/drawing/2010/main" xmlns="" w="9525">
+              <a14:hiddenLine xmlns="" xmlns:a14="http://schemas.microsoft.com/office/drawing/2010/main" w="9525">
                 <a:solidFill>
                   <a:srgbClr val="000000"/>
                 </a:solidFill>
@@ -1517,14 +1517,14 @@
           <a:ln/>
           <a:extLst>
             <a:ext uri="{909E8E84-426E-40dd-AFC4-6F175D3DCCD1}">
-              <a14:hiddenFill xmlns:a14="http://schemas.microsoft.com/office/drawing/2010/main" xmlns="">
+              <a14:hiddenFill xmlns="" xmlns:a14="http://schemas.microsoft.com/office/drawing/2010/main">
                 <a:solidFill>
                   <a:srgbClr val="FFFFFF"/>
                 </a:solidFill>
               </a14:hiddenFill>
             </a:ext>
             <a:ext uri="{91240B29-F687-4f45-9708-019B960494DF}">
-              <a14:hiddenLine xmlns:a14="http://schemas.microsoft.com/office/drawing/2010/main" xmlns="" w="9525">
+              <a14:hiddenLine xmlns="" xmlns:a14="http://schemas.microsoft.com/office/drawing/2010/main" w="9525">
                 <a:solidFill>
                   <a:srgbClr val="000000"/>
                 </a:solidFill>
@@ -1702,7 +1702,7 @@
           </a:ln>
           <a:extLst>
             <a:ext uri="{FAA26D3D-D897-4be2-8F04-BA451C77F1D7}">
-              <ma14:placeholderFlag xmlns:ma14="http://schemas.microsoft.com/office/mac/drawingml/2011/main" xmlns="" val="1"/>
+              <ma14:placeholderFlag xmlns="" xmlns:ma14="http://schemas.microsoft.com/office/mac/drawingml/2011/main" val="1"/>
             </a:ext>
           </a:extLst>
         </p:spPr>
@@ -4893,17 +4893,17 @@
           </a:ln>
           <a:extLst>
             <a:ext uri="{FAA26D3D-D897-4be2-8F04-BA451C77F1D7}">
-              <ma14:placeholderFlag xmlns:ma14="http://schemas.microsoft.com/office/mac/drawingml/2011/main" xmlns="" val="1"/>
+              <ma14:placeholderFlag xmlns="" xmlns:ma14="http://schemas.microsoft.com/office/mac/drawingml/2011/main" val="1"/>
             </a:ext>
             <a:ext uri="{909E8E84-426E-40dd-AFC4-6F175D3DCCD1}">
-              <a14:hiddenFill xmlns:a14="http://schemas.microsoft.com/office/drawing/2010/main" xmlns="">
+              <a14:hiddenFill xmlns="" xmlns:a14="http://schemas.microsoft.com/office/drawing/2010/main">
                 <a:solidFill>
                   <a:srgbClr val="FFFFFF"/>
                 </a:solidFill>
               </a14:hiddenFill>
             </a:ext>
             <a:ext uri="{91240B29-F687-4f45-9708-019B960494DF}">
-              <a14:hiddenLine xmlns:a14="http://schemas.microsoft.com/office/drawing/2010/main" xmlns="" w="9525">
+              <a14:hiddenLine xmlns="" xmlns:a14="http://schemas.microsoft.com/office/drawing/2010/main" w="9525">
                 <a:solidFill>
                   <a:srgbClr val="000000"/>
                 </a:solidFill>
@@ -18902,6 +18902,67 @@
               <a:t>Next lecture on October 17</a:t>
             </a:r>
           </a:p>
+          <a:p>
+            <a:endParaRPr lang="en-US" dirty="0">
+              <a:solidFill>
+                <a:srgbClr val="0000FF"/>
+              </a:solidFill>
+            </a:endParaRPr>
+          </a:p>
+          <a:p>
+            <a:r>
+              <a:rPr lang="en-US" dirty="0"/>
+              <a:t>Please provide midterm </a:t>
+            </a:r>
+            <a:r>
+              <a:rPr lang="en-US" dirty="0" err="1"/>
+              <a:t>eval</a:t>
+            </a:r>
+            <a:r>
+              <a:rPr lang="en-US" dirty="0"/>
+              <a:t> at </a:t>
+            </a:r>
+            <a:r>
+              <a:rPr lang="en-US" dirty="0">
+                <a:solidFill>
+                  <a:srgbClr val="0000FF"/>
+                </a:solidFill>
+              </a:rPr>
+              <a:t>https://</a:t>
+            </a:r>
+            <a:r>
+              <a:rPr lang="en-US" dirty="0" err="1">
+                <a:solidFill>
+                  <a:srgbClr val="0000FF"/>
+                </a:solidFill>
+              </a:rPr>
+              <a:t>umich.bluera.com</a:t>
+            </a:r>
+            <a:r>
+              <a:rPr lang="en-US" dirty="0">
+                <a:solidFill>
+                  <a:srgbClr val="0000FF"/>
+                </a:solidFill>
+              </a:rPr>
+              <a:t>/</a:t>
+            </a:r>
+            <a:r>
+              <a:rPr lang="en-US" dirty="0" err="1">
+                <a:solidFill>
+                  <a:srgbClr val="0000FF"/>
+                </a:solidFill>
+              </a:rPr>
+              <a:t>umich</a:t>
+            </a:r>
+            <a:r>
+              <a:rPr lang="en-US" dirty="0">
+                <a:solidFill>
+                  <a:srgbClr val="0000FF"/>
+                </a:solidFill>
+              </a:rPr>
+              <a:t>/</a:t>
+            </a:r>
+          </a:p>
         </p:txBody>
       </p:sp>
       <p:sp>
@@ -19345,7 +19406,7 @@
           </a:ln>
           <a:extLst>
             <a:ext uri="{909E8E84-426E-40dd-AFC4-6F175D3DCCD1}">
-              <a14:hiddenFill xmlns:a14="http://schemas.microsoft.com/office/drawing/2010/main" xmlns="">
+              <a14:hiddenFill xmlns="" xmlns:a14="http://schemas.microsoft.com/office/drawing/2010/main">
                 <a:solidFill>
                   <a:srgbClr val="FFFFFF"/>
                 </a:solidFill>
@@ -19388,7 +19449,7 @@
           </a:ln>
           <a:extLst>
             <a:ext uri="{909E8E84-426E-40dd-AFC4-6F175D3DCCD1}">
-              <a14:hiddenFill xmlns:a14="http://schemas.microsoft.com/office/drawing/2010/main" xmlns="">
+              <a14:hiddenFill xmlns="" xmlns:a14="http://schemas.microsoft.com/office/drawing/2010/main">
                 <a:noFill/>
               </a14:hiddenFill>
             </a:ext>
@@ -19424,14 +19485,14 @@
           </a:ln>
           <a:extLst>
             <a:ext uri="{909E8E84-426E-40dd-AFC4-6F175D3DCCD1}">
-              <a14:hiddenFill xmlns:a14="http://schemas.microsoft.com/office/drawing/2010/main" xmlns="">
+              <a14:hiddenFill xmlns="" xmlns:a14="http://schemas.microsoft.com/office/drawing/2010/main">
                 <a:solidFill>
                   <a:srgbClr val="FFFFFF"/>
                 </a:solidFill>
               </a14:hiddenFill>
             </a:ext>
             <a:ext uri="{91240B29-F687-4f45-9708-019B960494DF}">
-              <a14:hiddenLine xmlns:a14="http://schemas.microsoft.com/office/drawing/2010/main" xmlns="" w="9525">
+              <a14:hiddenLine xmlns="" xmlns:a14="http://schemas.microsoft.com/office/drawing/2010/main" w="9525">
                 <a:solidFill>
                   <a:srgbClr val="000000"/>
                 </a:solidFill>
@@ -19657,7 +19718,7 @@
           </a:ln>
           <a:extLst>
             <a:ext uri="{909E8E84-426E-40dd-AFC4-6F175D3DCCD1}">
-              <a14:hiddenFill xmlns:a14="http://schemas.microsoft.com/office/drawing/2010/main" xmlns="">
+              <a14:hiddenFill xmlns="" xmlns:a14="http://schemas.microsoft.com/office/drawing/2010/main">
                 <a:solidFill>
                   <a:srgbClr val="FFFFFF"/>
                 </a:solidFill>
@@ -19695,14 +19756,14 @@
           </a:ln>
           <a:extLst>
             <a:ext uri="{909E8E84-426E-40dd-AFC4-6F175D3DCCD1}">
-              <a14:hiddenFill xmlns:a14="http://schemas.microsoft.com/office/drawing/2010/main" xmlns="">
+              <a14:hiddenFill xmlns="" xmlns:a14="http://schemas.microsoft.com/office/drawing/2010/main">
                 <a:solidFill>
                   <a:srgbClr val="FFFFFF"/>
                 </a:solidFill>
               </a14:hiddenFill>
             </a:ext>
             <a:ext uri="{91240B29-F687-4f45-9708-019B960494DF}">
-              <a14:hiddenLine xmlns:a14="http://schemas.microsoft.com/office/drawing/2010/main" xmlns="" w="9525">
+              <a14:hiddenLine xmlns="" xmlns:a14="http://schemas.microsoft.com/office/drawing/2010/main" w="9525">
                 <a:solidFill>
                   <a:srgbClr val="000000"/>
                 </a:solidFill>
@@ -19858,14 +19919,14 @@
           </a:ln>
           <a:extLst>
             <a:ext uri="{909E8E84-426E-40dd-AFC4-6F175D3DCCD1}">
-              <a14:hiddenFill xmlns:a14="http://schemas.microsoft.com/office/drawing/2010/main" xmlns="">
+              <a14:hiddenFill xmlns="" xmlns:a14="http://schemas.microsoft.com/office/drawing/2010/main">
                 <a:solidFill>
                   <a:srgbClr val="FFFFFF"/>
                 </a:solidFill>
               </a14:hiddenFill>
             </a:ext>
             <a:ext uri="{91240B29-F687-4f45-9708-019B960494DF}">
-              <a14:hiddenLine xmlns:a14="http://schemas.microsoft.com/office/drawing/2010/main" xmlns="" w="9525">
+              <a14:hiddenLine xmlns="" xmlns:a14="http://schemas.microsoft.com/office/drawing/2010/main" w="9525">
                 <a:solidFill>
                   <a:srgbClr val="000000"/>
                 </a:solidFill>
@@ -20067,7 +20128,7 @@
           </a:ln>
           <a:extLst>
             <a:ext uri="{909E8E84-426E-40dd-AFC4-6F175D3DCCD1}">
-              <a14:hiddenFill xmlns:a14="http://schemas.microsoft.com/office/drawing/2010/main" xmlns="">
+              <a14:hiddenFill xmlns="" xmlns:a14="http://schemas.microsoft.com/office/drawing/2010/main">
                 <a:solidFill>
                   <a:srgbClr val="FFFFFF"/>
                 </a:solidFill>
@@ -20151,7 +20212,7 @@
           </a:ln>
           <a:extLst>
             <a:ext uri="{909E8E84-426E-40dd-AFC4-6F175D3DCCD1}">
-              <a14:hiddenFill xmlns:a14="http://schemas.microsoft.com/office/drawing/2010/main" xmlns="">
+              <a14:hiddenFill xmlns="" xmlns:a14="http://schemas.microsoft.com/office/drawing/2010/main">
                 <a:solidFill>
                   <a:srgbClr val="FFFFFF"/>
                 </a:solidFill>
@@ -20235,7 +20296,7 @@
           </a:ln>
           <a:extLst>
             <a:ext uri="{909E8E84-426E-40dd-AFC4-6F175D3DCCD1}">
-              <a14:hiddenFill xmlns:a14="http://schemas.microsoft.com/office/drawing/2010/main" xmlns="">
+              <a14:hiddenFill xmlns="" xmlns:a14="http://schemas.microsoft.com/office/drawing/2010/main">
                 <a:solidFill>
                   <a:srgbClr val="FFFFFF"/>
                 </a:solidFill>
@@ -20278,7 +20339,7 @@
           </a:ln>
           <a:extLst>
             <a:ext uri="{909E8E84-426E-40dd-AFC4-6F175D3DCCD1}">
-              <a14:hiddenFill xmlns:a14="http://schemas.microsoft.com/office/drawing/2010/main" xmlns="">
+              <a14:hiddenFill xmlns="" xmlns:a14="http://schemas.microsoft.com/office/drawing/2010/main">
                 <a:noFill/>
               </a14:hiddenFill>
             </a:ext>
@@ -20319,7 +20380,7 @@
           </a:ln>
           <a:extLst>
             <a:ext uri="{909E8E84-426E-40dd-AFC4-6F175D3DCCD1}">
-              <a14:hiddenFill xmlns:a14="http://schemas.microsoft.com/office/drawing/2010/main" xmlns="">
+              <a14:hiddenFill xmlns="" xmlns:a14="http://schemas.microsoft.com/office/drawing/2010/main">
                 <a:noFill/>
               </a14:hiddenFill>
             </a:ext>
@@ -20360,7 +20421,7 @@
           </a:ln>
           <a:extLst>
             <a:ext uri="{909E8E84-426E-40dd-AFC4-6F175D3DCCD1}">
-              <a14:hiddenFill xmlns:a14="http://schemas.microsoft.com/office/drawing/2010/main" xmlns="">
+              <a14:hiddenFill xmlns="" xmlns:a14="http://schemas.microsoft.com/office/drawing/2010/main">
                 <a:noFill/>
               </a14:hiddenFill>
             </a:ext>
@@ -20403,7 +20464,7 @@
           </a:ln>
           <a:extLst>
             <a:ext uri="{909E8E84-426E-40dd-AFC4-6F175D3DCCD1}">
-              <a14:hiddenFill xmlns:a14="http://schemas.microsoft.com/office/drawing/2010/main" xmlns="">
+              <a14:hiddenFill xmlns="" xmlns:a14="http://schemas.microsoft.com/office/drawing/2010/main">
                 <a:noFill/>
               </a14:hiddenFill>
             </a:ext>
@@ -20438,7 +20499,7 @@
           </a:ln>
           <a:extLst>
             <a:ext uri="{909E8E84-426E-40dd-AFC4-6F175D3DCCD1}">
-              <a14:hiddenFill xmlns:a14="http://schemas.microsoft.com/office/drawing/2010/main" xmlns="">
+              <a14:hiddenFill xmlns="" xmlns:a14="http://schemas.microsoft.com/office/drawing/2010/main">
                 <a:noFill/>
               </a14:hiddenFill>
             </a:ext>
@@ -20474,7 +20535,7 @@
           </a:ln>
           <a:extLst>
             <a:ext uri="{909E8E84-426E-40dd-AFC4-6F175D3DCCD1}">
-              <a14:hiddenFill xmlns:a14="http://schemas.microsoft.com/office/drawing/2010/main" xmlns="">
+              <a14:hiddenFill xmlns="" xmlns:a14="http://schemas.microsoft.com/office/drawing/2010/main">
                 <a:noFill/>
               </a14:hiddenFill>
             </a:ext>
@@ -20509,7 +20570,7 @@
           </a:ln>
           <a:extLst>
             <a:ext uri="{909E8E84-426E-40dd-AFC4-6F175D3DCCD1}">
-              <a14:hiddenFill xmlns:a14="http://schemas.microsoft.com/office/drawing/2010/main" xmlns="">
+              <a14:hiddenFill xmlns="" xmlns:a14="http://schemas.microsoft.com/office/drawing/2010/main">
                 <a:noFill/>
               </a14:hiddenFill>
             </a:ext>
@@ -20559,7 +20620,7 @@
             </a:ln>
             <a:extLst>
               <a:ext uri="{909E8E84-426E-40dd-AFC4-6F175D3DCCD1}">
-                <a14:hiddenFill xmlns:a14="http://schemas.microsoft.com/office/drawing/2010/main" xmlns="">
+                <a14:hiddenFill xmlns="" xmlns:a14="http://schemas.microsoft.com/office/drawing/2010/main">
                   <a:solidFill>
                     <a:srgbClr val="FFFFFF"/>
                   </a:solidFill>
@@ -20604,7 +20665,7 @@
             </a:ln>
             <a:extLst>
               <a:ext uri="{909E8E84-426E-40dd-AFC4-6F175D3DCCD1}">
-                <a14:hiddenFill xmlns:a14="http://schemas.microsoft.com/office/drawing/2010/main" xmlns="">
+                <a14:hiddenFill xmlns="" xmlns:a14="http://schemas.microsoft.com/office/drawing/2010/main">
                   <a:noFill/>
                 </a14:hiddenFill>
               </a:ext>
@@ -20749,7 +20810,7 @@
               </a:ln>
               <a:extLst>
                 <a:ext uri="{909E8E84-426E-40dd-AFC4-6F175D3DCCD1}">
-                  <a14:hiddenFill xmlns:a14="http://schemas.microsoft.com/office/drawing/2010/main" xmlns="">
+                  <a14:hiddenFill xmlns="" xmlns:a14="http://schemas.microsoft.com/office/drawing/2010/main">
                     <a:solidFill>
                       <a:srgbClr val="FFFFFF"/>
                     </a:solidFill>
@@ -20851,7 +20912,7 @@
               </a:ln>
               <a:extLst>
                 <a:ext uri="{909E8E84-426E-40dd-AFC4-6F175D3DCCD1}">
-                  <a14:hiddenFill xmlns:a14="http://schemas.microsoft.com/office/drawing/2010/main" xmlns="">
+                  <a14:hiddenFill xmlns="" xmlns:a14="http://schemas.microsoft.com/office/drawing/2010/main">
                     <a:solidFill>
                       <a:srgbClr val="FFFFFF"/>
                     </a:solidFill>
@@ -20953,7 +21014,7 @@
               </a:ln>
               <a:extLst>
                 <a:ext uri="{909E8E84-426E-40dd-AFC4-6F175D3DCCD1}">
-                  <a14:hiddenFill xmlns:a14="http://schemas.microsoft.com/office/drawing/2010/main" xmlns="">
+                  <a14:hiddenFill xmlns="" xmlns:a14="http://schemas.microsoft.com/office/drawing/2010/main">
                     <a:solidFill>
                       <a:srgbClr val="FFFFFF"/>
                     </a:solidFill>
@@ -21055,7 +21116,7 @@
               </a:ln>
               <a:extLst>
                 <a:ext uri="{909E8E84-426E-40dd-AFC4-6F175D3DCCD1}">
-                  <a14:hiddenFill xmlns:a14="http://schemas.microsoft.com/office/drawing/2010/main" xmlns="">
+                  <a14:hiddenFill xmlns="" xmlns:a14="http://schemas.microsoft.com/office/drawing/2010/main">
                     <a:solidFill>
                       <a:srgbClr val="FFFFFF"/>
                     </a:solidFill>
@@ -21093,14 +21154,14 @@
               </a:ln>
               <a:extLst>
                 <a:ext uri="{909E8E84-426E-40dd-AFC4-6F175D3DCCD1}">
-                  <a14:hiddenFill xmlns:a14="http://schemas.microsoft.com/office/drawing/2010/main" xmlns="">
+                  <a14:hiddenFill xmlns="" xmlns:a14="http://schemas.microsoft.com/office/drawing/2010/main">
                     <a:solidFill>
                       <a:srgbClr val="FFFFFF"/>
                     </a:solidFill>
                   </a14:hiddenFill>
                 </a:ext>
                 <a:ext uri="{91240B29-F687-4f45-9708-019B960494DF}">
-                  <a14:hiddenLine xmlns:a14="http://schemas.microsoft.com/office/drawing/2010/main" xmlns="" w="9525">
+                  <a14:hiddenLine xmlns="" xmlns:a14="http://schemas.microsoft.com/office/drawing/2010/main" w="9525">
                     <a:solidFill>
                       <a:srgbClr val="000000"/>
                     </a:solidFill>
@@ -21254,14 +21315,14 @@
               </a:ln>
               <a:extLst>
                 <a:ext uri="{909E8E84-426E-40dd-AFC4-6F175D3DCCD1}">
-                  <a14:hiddenFill xmlns:a14="http://schemas.microsoft.com/office/drawing/2010/main" xmlns="">
+                  <a14:hiddenFill xmlns="" xmlns:a14="http://schemas.microsoft.com/office/drawing/2010/main">
                     <a:solidFill>
                       <a:srgbClr val="FFFFFF"/>
                     </a:solidFill>
                   </a14:hiddenFill>
                 </a:ext>
                 <a:ext uri="{91240B29-F687-4f45-9708-019B960494DF}">
-                  <a14:hiddenLine xmlns:a14="http://schemas.microsoft.com/office/drawing/2010/main" xmlns="" w="9525">
+                  <a14:hiddenLine xmlns="" xmlns:a14="http://schemas.microsoft.com/office/drawing/2010/main" w="9525">
                     <a:solidFill>
                       <a:srgbClr val="000000"/>
                     </a:solidFill>
@@ -21423,7 +21484,7 @@
               </a:ln>
               <a:extLst>
                 <a:ext uri="{909E8E84-426E-40dd-AFC4-6F175D3DCCD1}">
-                  <a14:hiddenFill xmlns:a14="http://schemas.microsoft.com/office/drawing/2010/main" xmlns="">
+                  <a14:hiddenFill xmlns="" xmlns:a14="http://schemas.microsoft.com/office/drawing/2010/main">
                     <a:noFill/>
                   </a14:hiddenFill>
                 </a:ext>
@@ -21457,7 +21518,7 @@
               </a:ln>
               <a:extLst>
                 <a:ext uri="{909E8E84-426E-40dd-AFC4-6F175D3DCCD1}">
-                  <a14:hiddenFill xmlns:a14="http://schemas.microsoft.com/office/drawing/2010/main" xmlns="">
+                  <a14:hiddenFill xmlns="" xmlns:a14="http://schemas.microsoft.com/office/drawing/2010/main">
                     <a:noFill/>
                   </a14:hiddenFill>
                 </a:ext>
@@ -21482,7 +21543,7 @@
           <a:graphicData uri="http://schemas.openxmlformats.org/presentationml/2006/ole">
             <mc:AlternateContent xmlns:mc="http://schemas.openxmlformats.org/markup-compatibility/2006">
               <mc:Choice xmlns:v="urn:schemas-microsoft-com:vml" Requires="v">
-                <p:oleObj spid="_x0000_s1116" name="Equation" r:id="rId3" imgW="317362" imgH="228501" progId="Equation.3">
+                <p:oleObj spid="_x0000_s1168" name="Equation" r:id="rId3" imgW="317362" imgH="228501" progId="Equation.3">
                   <p:embed/>
                 </p:oleObj>
               </mc:Choice>
@@ -21525,14 +21586,14 @@
                       <a:effectLst/>
                       <a:extLst>
                         <a:ext uri="{909E8E84-426E-40dd-AFC4-6F175D3DCCD1}">
-                          <a14:hiddenFill xmlns:a14="http://schemas.microsoft.com/office/drawing/2010/main" xmlns="">
+                          <a14:hiddenFill xmlns="" xmlns:a14="http://schemas.microsoft.com/office/drawing/2010/main">
                             <a:solidFill>
                               <a:srgbClr val="FFFFFF"/>
                             </a:solidFill>
                           </a14:hiddenFill>
                         </a:ext>
                         <a:ext uri="{91240B29-F687-4f45-9708-019B960494DF}">
-                          <a14:hiddenLine xmlns:a14="http://schemas.microsoft.com/office/drawing/2010/main" xmlns="" w="9525">
+                          <a14:hiddenLine xmlns="" xmlns:a14="http://schemas.microsoft.com/office/drawing/2010/main" w="9525">
                             <a:solidFill>
                               <a:srgbClr val="000000"/>
                             </a:solidFill>
@@ -21542,7 +21603,7 @@
                           </a14:hiddenLine>
                         </a:ext>
                         <a:ext uri="{AF507438-7753-43e0-B8FC-AC1667EBCBE1}">
-                          <a14:hiddenEffects xmlns:a14="http://schemas.microsoft.com/office/drawing/2010/main" xmlns="">
+                          <a14:hiddenEffects xmlns="" xmlns:a14="http://schemas.microsoft.com/office/drawing/2010/main">
                             <a:effectLst>
                               <a:outerShdw blurRad="63500" dist="38099" dir="2700000" algn="ctr" rotWithShape="0">
                                 <a:srgbClr val="000000">
@@ -21577,7 +21638,7 @@
           <a:graphicData uri="http://schemas.openxmlformats.org/presentationml/2006/ole">
             <mc:AlternateContent xmlns:mc="http://schemas.openxmlformats.org/markup-compatibility/2006">
               <mc:Choice xmlns:v="urn:schemas-microsoft-com:vml" Requires="v">
-                <p:oleObj spid="_x0000_s1117" name="Equation" r:id="rId5" imgW="355292" imgH="393359" progId="Equation.3">
+                <p:oleObj spid="_x0000_s1169" name="Equation" r:id="rId5" imgW="355292" imgH="393359" progId="Equation.3">
                   <p:embed/>
                 </p:oleObj>
               </mc:Choice>
@@ -21620,14 +21681,14 @@
                       <a:effectLst/>
                       <a:extLst>
                         <a:ext uri="{909E8E84-426E-40dd-AFC4-6F175D3DCCD1}">
-                          <a14:hiddenFill xmlns:a14="http://schemas.microsoft.com/office/drawing/2010/main" xmlns="">
+                          <a14:hiddenFill xmlns="" xmlns:a14="http://schemas.microsoft.com/office/drawing/2010/main">
                             <a:solidFill>
                               <a:srgbClr val="FFFFFF"/>
                             </a:solidFill>
                           </a14:hiddenFill>
                         </a:ext>
                         <a:ext uri="{91240B29-F687-4f45-9708-019B960494DF}">
-                          <a14:hiddenLine xmlns:a14="http://schemas.microsoft.com/office/drawing/2010/main" xmlns="" w="9525">
+                          <a14:hiddenLine xmlns="" xmlns:a14="http://schemas.microsoft.com/office/drawing/2010/main" w="9525">
                             <a:solidFill>
                               <a:srgbClr val="000000"/>
                             </a:solidFill>
@@ -21637,7 +21698,7 @@
                           </a14:hiddenLine>
                         </a:ext>
                         <a:ext uri="{AF507438-7753-43e0-B8FC-AC1667EBCBE1}">
-                          <a14:hiddenEffects xmlns:a14="http://schemas.microsoft.com/office/drawing/2010/main" xmlns="">
+                          <a14:hiddenEffects xmlns="" xmlns:a14="http://schemas.microsoft.com/office/drawing/2010/main">
                             <a:effectLst>
                               <a:outerShdw blurRad="63500" dist="38099" dir="2700000" algn="ctr" rotWithShape="0">
                                 <a:srgbClr val="000000">
@@ -22327,6 +22388,110 @@
       </p:grpSpPr>
       <p:sp>
         <p:nvSpPr>
+          <p:cNvPr id="4" name="TextBox 3">
+            <a:extLst>
+              <a:ext uri="{FF2B5EF4-FFF2-40B4-BE49-F238E27FC236}">
+                <a16:creationId xmlns:a16="http://schemas.microsoft.com/office/drawing/2014/main" id="{47F792BE-4556-A84C-88DC-CC3CE7143D3B}"/>
+              </a:ext>
+            </a:extLst>
+          </p:cNvPr>
+          <p:cNvSpPr txBox="1"/>
+          <p:nvPr/>
+        </p:nvSpPr>
+        <p:spPr>
+          <a:xfrm>
+            <a:off x="3200400" y="6290846"/>
+            <a:ext cx="845103" cy="338554"/>
+          </a:xfrm>
+          <a:prstGeom prst="rect">
+            <a:avLst/>
+          </a:prstGeom>
+          <a:noFill/>
+        </p:spPr>
+        <p:txBody>
+          <a:bodyPr wrap="none" rtlCol="0">
+            <a:spAutoFit/>
+          </a:bodyPr>
+          <a:lstStyle/>
+          <a:p>
+            <a:r>
+              <a:rPr lang="en-US" b="0" dirty="0">
+                <a:solidFill>
+                  <a:srgbClr val="0000FF"/>
+                </a:solidFill>
+              </a:rPr>
+              <a:t>in MSS</a:t>
+            </a:r>
+          </a:p>
+        </p:txBody>
+      </p:sp>
+      <p:graphicFrame>
+        <p:nvGraphicFramePr>
+          <p:cNvPr id="35" name="Object 34"/>
+          <p:cNvGraphicFramePr>
+            <a:graphicFrameLocks noChangeAspect="1"/>
+          </p:cNvGraphicFramePr>
+          <p:nvPr>
+            <p:extLst>
+              <p:ext uri="{D42A27DB-BD31-4B8C-83A1-F6EECF244321}">
+                <p14:modId xmlns:p14="http://schemas.microsoft.com/office/powerpoint/2010/main" val="788863698"/>
+              </p:ext>
+            </p:extLst>
+          </p:nvPr>
+        </p:nvGraphicFramePr>
+        <p:xfrm>
+          <a:off x="3057525" y="4495800"/>
+          <a:ext cx="4257675" cy="2366962"/>
+        </p:xfrm>
+        <a:graphic>
+          <a:graphicData uri="http://schemas.openxmlformats.org/presentationml/2006/ole">
+            <mc:AlternateContent xmlns:mc="http://schemas.openxmlformats.org/markup-compatibility/2006">
+              <mc:Choice xmlns:v="urn:schemas-microsoft-com:vml" Requires="v">
+                <p:oleObj spid="_x0000_s2263" name="Equation" r:id="rId3" imgW="2717800" imgH="1511300" progId="Equation.3">
+                  <p:embed/>
+                </p:oleObj>
+              </mc:Choice>
+              <mc:Fallback>
+                <p:oleObj name="Equation" r:id="rId3" imgW="2717800" imgH="1511300" progId="Equation.3">
+                  <p:embed/>
+                  <p:pic>
+                    <p:nvPicPr>
+                      <p:cNvPr id="0" name=""/>
+                      <p:cNvPicPr>
+                        <a:picLocks noChangeAspect="1" noChangeArrowheads="1"/>
+                      </p:cNvPicPr>
+                      <p:nvPr/>
+                    </p:nvPicPr>
+                    <p:blipFill>
+                      <a:blip r:embed="rId4"/>
+                      <a:srcRect/>
+                      <a:stretch>
+                        <a:fillRect/>
+                      </a:stretch>
+                    </p:blipFill>
+                    <p:spPr bwMode="auto">
+                      <a:xfrm>
+                        <a:off x="3057525" y="4495800"/>
+                        <a:ext cx="4257675" cy="2366962"/>
+                      </a:xfrm>
+                      <a:prstGeom prst="rect">
+                        <a:avLst/>
+                      </a:prstGeom>
+                      <a:noFill/>
+                      <a:ln>
+                        <a:noFill/>
+                      </a:ln>
+                      <a:extLst/>
+                    </p:spPr>
+                  </p:pic>
+                </p:oleObj>
+              </mc:Fallback>
+            </mc:AlternateContent>
+          </a:graphicData>
+        </a:graphic>
+      </p:graphicFrame>
+      <p:sp>
+        <p:nvSpPr>
           <p:cNvPr id="3" name="Freeform 2"/>
           <p:cNvSpPr/>
           <p:nvPr/>
@@ -22517,7 +22682,7 @@
           </a:ln>
           <a:extLst>
             <a:ext uri="{909E8E84-426E-40dd-AFC4-6F175D3DCCD1}">
-              <a14:hiddenFill xmlns:a14="http://schemas.microsoft.com/office/drawing/2010/main" xmlns="">
+              <a14:hiddenFill xmlns="" xmlns:a14="http://schemas.microsoft.com/office/drawing/2010/main">
                 <a:solidFill>
                   <a:srgbClr val="FFFFFF"/>
                 </a:solidFill>
@@ -22560,7 +22725,7 @@
           </a:ln>
           <a:extLst>
             <a:ext uri="{909E8E84-426E-40dd-AFC4-6F175D3DCCD1}">
-              <a14:hiddenFill xmlns:a14="http://schemas.microsoft.com/office/drawing/2010/main" xmlns="">
+              <a14:hiddenFill xmlns="" xmlns:a14="http://schemas.microsoft.com/office/drawing/2010/main">
                 <a:noFill/>
               </a14:hiddenFill>
             </a:ext>
@@ -22596,14 +22761,14 @@
           </a:ln>
           <a:extLst>
             <a:ext uri="{909E8E84-426E-40dd-AFC4-6F175D3DCCD1}">
-              <a14:hiddenFill xmlns:a14="http://schemas.microsoft.com/office/drawing/2010/main" xmlns="">
+              <a14:hiddenFill xmlns="" xmlns:a14="http://schemas.microsoft.com/office/drawing/2010/main">
                 <a:solidFill>
                   <a:srgbClr val="FFFFFF"/>
                 </a:solidFill>
               </a14:hiddenFill>
             </a:ext>
             <a:ext uri="{91240B29-F687-4f45-9708-019B960494DF}">
-              <a14:hiddenLine xmlns:a14="http://schemas.microsoft.com/office/drawing/2010/main" xmlns="" w="9525">
+              <a14:hiddenLine xmlns="" xmlns:a14="http://schemas.microsoft.com/office/drawing/2010/main" w="9525">
                 <a:solidFill>
                   <a:srgbClr val="000000"/>
                 </a:solidFill>
@@ -22829,7 +22994,7 @@
           </a:ln>
           <a:extLst>
             <a:ext uri="{909E8E84-426E-40dd-AFC4-6F175D3DCCD1}">
-              <a14:hiddenFill xmlns:a14="http://schemas.microsoft.com/office/drawing/2010/main" xmlns="">
+              <a14:hiddenFill xmlns="" xmlns:a14="http://schemas.microsoft.com/office/drawing/2010/main">
                 <a:solidFill>
                   <a:srgbClr val="FFFFFF"/>
                 </a:solidFill>
@@ -22867,14 +23032,14 @@
           </a:ln>
           <a:extLst>
             <a:ext uri="{909E8E84-426E-40dd-AFC4-6F175D3DCCD1}">
-              <a14:hiddenFill xmlns:a14="http://schemas.microsoft.com/office/drawing/2010/main" xmlns="">
+              <a14:hiddenFill xmlns="" xmlns:a14="http://schemas.microsoft.com/office/drawing/2010/main">
                 <a:solidFill>
                   <a:srgbClr val="FFFFFF"/>
                 </a:solidFill>
               </a14:hiddenFill>
             </a:ext>
             <a:ext uri="{91240B29-F687-4f45-9708-019B960494DF}">
-              <a14:hiddenLine xmlns:a14="http://schemas.microsoft.com/office/drawing/2010/main" xmlns="" w="9525">
+              <a14:hiddenLine xmlns="" xmlns:a14="http://schemas.microsoft.com/office/drawing/2010/main" w="9525">
                 <a:solidFill>
                   <a:srgbClr val="000000"/>
                 </a:solidFill>
@@ -23030,14 +23195,14 @@
           </a:ln>
           <a:extLst>
             <a:ext uri="{909E8E84-426E-40dd-AFC4-6F175D3DCCD1}">
-              <a14:hiddenFill xmlns:a14="http://schemas.microsoft.com/office/drawing/2010/main" xmlns="">
+              <a14:hiddenFill xmlns="" xmlns:a14="http://schemas.microsoft.com/office/drawing/2010/main">
                 <a:solidFill>
                   <a:srgbClr val="FFFFFF"/>
                 </a:solidFill>
               </a14:hiddenFill>
             </a:ext>
             <a:ext uri="{91240B29-F687-4f45-9708-019B960494DF}">
-              <a14:hiddenLine xmlns:a14="http://schemas.microsoft.com/office/drawing/2010/main" xmlns="" w="9525">
+              <a14:hiddenLine xmlns="" xmlns:a14="http://schemas.microsoft.com/office/drawing/2010/main" w="9525">
                 <a:solidFill>
                   <a:srgbClr val="000000"/>
                 </a:solidFill>
@@ -23242,7 +23407,7 @@
           </a:ln>
           <a:extLst>
             <a:ext uri="{909E8E84-426E-40dd-AFC4-6F175D3DCCD1}">
-              <a14:hiddenFill xmlns:a14="http://schemas.microsoft.com/office/drawing/2010/main" xmlns="">
+              <a14:hiddenFill xmlns="" xmlns:a14="http://schemas.microsoft.com/office/drawing/2010/main">
                 <a:solidFill>
                   <a:srgbClr val="FFFFFF"/>
                 </a:solidFill>
@@ -23326,7 +23491,7 @@
           </a:ln>
           <a:extLst>
             <a:ext uri="{909E8E84-426E-40dd-AFC4-6F175D3DCCD1}">
-              <a14:hiddenFill xmlns:a14="http://schemas.microsoft.com/office/drawing/2010/main" xmlns="">
+              <a14:hiddenFill xmlns="" xmlns:a14="http://schemas.microsoft.com/office/drawing/2010/main">
                 <a:solidFill>
                   <a:srgbClr val="FFFFFF"/>
                 </a:solidFill>
@@ -23410,7 +23575,7 @@
           </a:ln>
           <a:extLst>
             <a:ext uri="{909E8E84-426E-40dd-AFC4-6F175D3DCCD1}">
-              <a14:hiddenFill xmlns:a14="http://schemas.microsoft.com/office/drawing/2010/main" xmlns="">
+              <a14:hiddenFill xmlns="" xmlns:a14="http://schemas.microsoft.com/office/drawing/2010/main">
                 <a:solidFill>
                   <a:srgbClr val="FFFFFF"/>
                 </a:solidFill>
@@ -23453,7 +23618,7 @@
           </a:ln>
           <a:extLst>
             <a:ext uri="{909E8E84-426E-40dd-AFC4-6F175D3DCCD1}">
-              <a14:hiddenFill xmlns:a14="http://schemas.microsoft.com/office/drawing/2010/main" xmlns="">
+              <a14:hiddenFill xmlns="" xmlns:a14="http://schemas.microsoft.com/office/drawing/2010/main">
                 <a:noFill/>
               </a14:hiddenFill>
             </a:ext>
@@ -23494,7 +23659,7 @@
           </a:ln>
           <a:extLst>
             <a:ext uri="{909E8E84-426E-40dd-AFC4-6F175D3DCCD1}">
-              <a14:hiddenFill xmlns:a14="http://schemas.microsoft.com/office/drawing/2010/main" xmlns="">
+              <a14:hiddenFill xmlns="" xmlns:a14="http://schemas.microsoft.com/office/drawing/2010/main">
                 <a:noFill/>
               </a14:hiddenFill>
             </a:ext>
@@ -23535,7 +23700,7 @@
           </a:ln>
           <a:extLst>
             <a:ext uri="{909E8E84-426E-40dd-AFC4-6F175D3DCCD1}">
-              <a14:hiddenFill xmlns:a14="http://schemas.microsoft.com/office/drawing/2010/main" xmlns="">
+              <a14:hiddenFill xmlns="" xmlns:a14="http://schemas.microsoft.com/office/drawing/2010/main">
                 <a:noFill/>
               </a14:hiddenFill>
             </a:ext>
@@ -23578,7 +23743,7 @@
           </a:ln>
           <a:extLst>
             <a:ext uri="{909E8E84-426E-40dd-AFC4-6F175D3DCCD1}">
-              <a14:hiddenFill xmlns:a14="http://schemas.microsoft.com/office/drawing/2010/main" xmlns="">
+              <a14:hiddenFill xmlns="" xmlns:a14="http://schemas.microsoft.com/office/drawing/2010/main">
                 <a:noFill/>
               </a14:hiddenFill>
             </a:ext>
@@ -23613,7 +23778,7 @@
           </a:ln>
           <a:extLst>
             <a:ext uri="{909E8E84-426E-40dd-AFC4-6F175D3DCCD1}">
-              <a14:hiddenFill xmlns:a14="http://schemas.microsoft.com/office/drawing/2010/main" xmlns="">
+              <a14:hiddenFill xmlns="" xmlns:a14="http://schemas.microsoft.com/office/drawing/2010/main">
                 <a:noFill/>
               </a14:hiddenFill>
             </a:ext>
@@ -23649,7 +23814,7 @@
           </a:ln>
           <a:extLst>
             <a:ext uri="{909E8E84-426E-40dd-AFC4-6F175D3DCCD1}">
-              <a14:hiddenFill xmlns:a14="http://schemas.microsoft.com/office/drawing/2010/main" xmlns="">
+              <a14:hiddenFill xmlns="" xmlns:a14="http://schemas.microsoft.com/office/drawing/2010/main">
                 <a:noFill/>
               </a14:hiddenFill>
             </a:ext>
@@ -23684,7 +23849,7 @@
           </a:ln>
           <a:extLst>
             <a:ext uri="{909E8E84-426E-40dd-AFC4-6F175D3DCCD1}">
-              <a14:hiddenFill xmlns:a14="http://schemas.microsoft.com/office/drawing/2010/main" xmlns="">
+              <a14:hiddenFill xmlns="" xmlns:a14="http://schemas.microsoft.com/office/drawing/2010/main">
                 <a:noFill/>
               </a14:hiddenFill>
             </a:ext>
@@ -23707,12 +23872,12 @@
           <a:graphicData uri="http://schemas.openxmlformats.org/presentationml/2006/ole">
             <mc:AlternateContent xmlns:mc="http://schemas.openxmlformats.org/markup-compatibility/2006">
               <mc:Choice xmlns:v="urn:schemas-microsoft-com:vml" Requires="v">
-                <p:oleObj spid="_x0000_s2185" name="Equation" r:id="rId3" imgW="317362" imgH="228501" progId="Equation.3">
+                <p:oleObj spid="_x0000_s2264" name="Equation" r:id="rId5" imgW="317362" imgH="228501" progId="Equation.3">
                   <p:embed/>
                 </p:oleObj>
               </mc:Choice>
               <mc:Fallback>
-                <p:oleObj name="Equation" r:id="rId3" imgW="317362" imgH="228501" progId="Equation.3">
+                <p:oleObj name="Equation" r:id="rId5" imgW="317362" imgH="228501" progId="Equation.3">
                   <p:embed/>
                   <p:pic>
                     <p:nvPicPr>
@@ -23723,7 +23888,7 @@
                       <p:nvPr/>
                     </p:nvPicPr>
                     <p:blipFill>
-                      <a:blip r:embed="rId4">
+                      <a:blip r:embed="rId6">
                         <a:extLst>
                           <a:ext uri="{28A0092B-C50C-407E-A947-70E740481C1C}">
                             <a14:useLocalDpi xmlns:a14="http://schemas.microsoft.com/office/drawing/2010/main" val="0"/>
@@ -23750,14 +23915,14 @@
                       <a:effectLst/>
                       <a:extLst>
                         <a:ext uri="{909E8E84-426E-40dd-AFC4-6F175D3DCCD1}">
-                          <a14:hiddenFill xmlns:a14="http://schemas.microsoft.com/office/drawing/2010/main" xmlns="">
+                          <a14:hiddenFill xmlns="" xmlns:a14="http://schemas.microsoft.com/office/drawing/2010/main">
                             <a:solidFill>
                               <a:srgbClr val="FFFFFF"/>
                             </a:solidFill>
                           </a14:hiddenFill>
                         </a:ext>
                         <a:ext uri="{91240B29-F687-4f45-9708-019B960494DF}">
-                          <a14:hiddenLine xmlns:a14="http://schemas.microsoft.com/office/drawing/2010/main" xmlns="" w="9525">
+                          <a14:hiddenLine xmlns="" xmlns:a14="http://schemas.microsoft.com/office/drawing/2010/main" w="9525">
                             <a:solidFill>
                               <a:srgbClr val="000000"/>
                             </a:solidFill>
@@ -23767,7 +23932,7 @@
                           </a14:hiddenLine>
                         </a:ext>
                         <a:ext uri="{AF507438-7753-43e0-B8FC-AC1667EBCBE1}">
-                          <a14:hiddenEffects xmlns:a14="http://schemas.microsoft.com/office/drawing/2010/main" xmlns="">
+                          <a14:hiddenEffects xmlns="" xmlns:a14="http://schemas.microsoft.com/office/drawing/2010/main">
                             <a:effectLst>
                               <a:outerShdw blurRad="63500" dist="38099" dir="2700000" algn="ctr" rotWithShape="0">
                                 <a:srgbClr val="000000">
@@ -23802,12 +23967,12 @@
           <a:graphicData uri="http://schemas.openxmlformats.org/presentationml/2006/ole">
             <mc:AlternateContent xmlns:mc="http://schemas.openxmlformats.org/markup-compatibility/2006">
               <mc:Choice xmlns:v="urn:schemas-microsoft-com:vml" Requires="v">
-                <p:oleObj spid="_x0000_s2186" name="Equation" r:id="rId5" imgW="355292" imgH="393359" progId="Equation.3">
+                <p:oleObj spid="_x0000_s2265" name="Equation" r:id="rId7" imgW="355292" imgH="393359" progId="Equation.3">
                   <p:embed/>
                 </p:oleObj>
               </mc:Choice>
               <mc:Fallback>
-                <p:oleObj name="Equation" r:id="rId5" imgW="355292" imgH="393359" progId="Equation.3">
+                <p:oleObj name="Equation" r:id="rId7" imgW="355292" imgH="393359" progId="Equation.3">
                   <p:embed/>
                   <p:pic>
                     <p:nvPicPr>
@@ -23818,7 +23983,7 @@
                       <p:nvPr/>
                     </p:nvPicPr>
                     <p:blipFill>
-                      <a:blip r:embed="rId6">
+                      <a:blip r:embed="rId8">
                         <a:extLst>
                           <a:ext uri="{28A0092B-C50C-407E-A947-70E740481C1C}">
                             <a14:useLocalDpi xmlns:a14="http://schemas.microsoft.com/office/drawing/2010/main" val="0"/>
@@ -23845,14 +24010,14 @@
                       <a:effectLst/>
                       <a:extLst>
                         <a:ext uri="{909E8E84-426E-40dd-AFC4-6F175D3DCCD1}">
-                          <a14:hiddenFill xmlns:a14="http://schemas.microsoft.com/office/drawing/2010/main" xmlns="">
+                          <a14:hiddenFill xmlns="" xmlns:a14="http://schemas.microsoft.com/office/drawing/2010/main">
                             <a:solidFill>
                               <a:srgbClr val="FFFFFF"/>
                             </a:solidFill>
                           </a14:hiddenFill>
                         </a:ext>
                         <a:ext uri="{91240B29-F687-4f45-9708-019B960494DF}">
-                          <a14:hiddenLine xmlns:a14="http://schemas.microsoft.com/office/drawing/2010/main" xmlns="" w="9525">
+                          <a14:hiddenLine xmlns="" xmlns:a14="http://schemas.microsoft.com/office/drawing/2010/main" w="9525">
                             <a:solidFill>
                               <a:srgbClr val="000000"/>
                             </a:solidFill>
@@ -23862,7 +24027,7 @@
                           </a14:hiddenLine>
                         </a:ext>
                         <a:ext uri="{AF507438-7753-43e0-B8FC-AC1667EBCBE1}">
-                          <a14:hiddenEffects xmlns:a14="http://schemas.microsoft.com/office/drawing/2010/main" xmlns="">
+                          <a14:hiddenEffects xmlns="" xmlns:a14="http://schemas.microsoft.com/office/drawing/2010/main">
                             <a:effectLst>
                               <a:outerShdw blurRad="63500" dist="38099" dir="2700000" algn="ctr" rotWithShape="0">
                                 <a:srgbClr val="000000">
@@ -23881,67 +24046,6 @@
           </a:graphicData>
         </a:graphic>
       </p:graphicFrame>
-      <p:graphicFrame>
-        <p:nvGraphicFramePr>
-          <p:cNvPr id="35" name="Object 34"/>
-          <p:cNvGraphicFramePr>
-            <a:graphicFrameLocks noChangeAspect="1"/>
-          </p:cNvGraphicFramePr>
-          <p:nvPr>
-            <p:extLst/>
-          </p:nvPr>
-        </p:nvGraphicFramePr>
-        <p:xfrm>
-          <a:off x="3057525" y="4495800"/>
-          <a:ext cx="4257675" cy="2366962"/>
-        </p:xfrm>
-        <a:graphic>
-          <a:graphicData uri="http://schemas.openxmlformats.org/presentationml/2006/ole">
-            <mc:AlternateContent xmlns:mc="http://schemas.openxmlformats.org/markup-compatibility/2006">
-              <mc:Choice xmlns:v="urn:schemas-microsoft-com:vml" Requires="v">
-                <p:oleObj spid="_x0000_s2187" name="Equation" r:id="rId7" imgW="2717800" imgH="1511300" progId="Equation.3">
-                  <p:embed/>
-                </p:oleObj>
-              </mc:Choice>
-              <mc:Fallback>
-                <p:oleObj name="Equation" r:id="rId7" imgW="2717800" imgH="1511300" progId="Equation.3">
-                  <p:embed/>
-                  <p:pic>
-                    <p:nvPicPr>
-                      <p:cNvPr id="0" name=""/>
-                      <p:cNvPicPr>
-                        <a:picLocks noChangeAspect="1" noChangeArrowheads="1"/>
-                      </p:cNvPicPr>
-                      <p:nvPr/>
-                    </p:nvPicPr>
-                    <p:blipFill>
-                      <a:blip r:embed="rId8"/>
-                      <a:srcRect/>
-                      <a:stretch>
-                        <a:fillRect/>
-                      </a:stretch>
-                    </p:blipFill>
-                    <p:spPr bwMode="auto">
-                      <a:xfrm>
-                        <a:off x="3057525" y="4495800"/>
-                        <a:ext cx="4257675" cy="2366962"/>
-                      </a:xfrm>
-                      <a:prstGeom prst="rect">
-                        <a:avLst/>
-                      </a:prstGeom>
-                      <a:noFill/>
-                      <a:ln>
-                        <a:noFill/>
-                      </a:ln>
-                      <a:extLst/>
-                    </p:spPr>
-                  </p:pic>
-                </p:oleObj>
-              </mc:Fallback>
-            </mc:AlternateContent>
-          </a:graphicData>
-        </a:graphic>
-      </p:graphicFrame>
       <p:sp>
         <p:nvSpPr>
           <p:cNvPr id="2" name="Rectangle 1"/>
@@ -23951,7 +24055,7 @@
         <p:spPr bwMode="auto">
           <a:xfrm>
             <a:off x="2743200" y="5486400"/>
-            <a:ext cx="4800600" cy="1371600"/>
+            <a:ext cx="4800600" cy="551038"/>
           </a:xfrm>
           <a:prstGeom prst="rect">
             <a:avLst/>
@@ -24015,8 +24119,8 @@
         </p:nvSpPr>
         <p:spPr bwMode="auto">
           <a:xfrm>
-            <a:off x="2819400" y="5867400"/>
-            <a:ext cx="4800600" cy="990600"/>
+            <a:off x="2743200" y="5867400"/>
+            <a:ext cx="5257800" cy="990600"/>
           </a:xfrm>
           <a:prstGeom prst="rect">
             <a:avLst/>
@@ -24557,6 +24661,51 @@
                       </p:childTnLst>
                     </p:cTn>
                   </p:par>
+                  <p:par>
+                    <p:cTn id="11" fill="hold">
+                      <p:stCondLst>
+                        <p:cond delay="indefinite"/>
+                      </p:stCondLst>
+                      <p:childTnLst>
+                        <p:par>
+                          <p:cTn id="12" fill="hold">
+                            <p:stCondLst>
+                              <p:cond delay="0"/>
+                            </p:stCondLst>
+                            <p:childTnLst>
+                              <p:par>
+                                <p:cTn id="13" presetID="1" presetClass="entr" presetSubtype="0" fill="hold" grpId="0" nodeType="clickEffect">
+                                  <p:stCondLst>
+                                    <p:cond delay="0"/>
+                                  </p:stCondLst>
+                                  <p:childTnLst>
+                                    <p:set>
+                                      <p:cBhvr>
+                                        <p:cTn id="14" dur="1" fill="hold">
+                                          <p:stCondLst>
+                                            <p:cond delay="0"/>
+                                          </p:stCondLst>
+                                        </p:cTn>
+                                        <p:tgtEl>
+                                          <p:spTgt spid="4"/>
+                                        </p:tgtEl>
+                                        <p:attrNameLst>
+                                          <p:attrName>style.visibility</p:attrName>
+                                        </p:attrNameLst>
+                                      </p:cBhvr>
+                                      <p:to>
+                                        <p:strVal val="visible"/>
+                                      </p:to>
+                                    </p:set>
+                                  </p:childTnLst>
+                                </p:cTn>
+                              </p:par>
+                            </p:childTnLst>
+                          </p:cTn>
+                        </p:par>
+                      </p:childTnLst>
+                    </p:cTn>
+                  </p:par>
                 </p:childTnLst>
               </p:cTn>
               <p:prevCondLst>
@@ -24579,6 +24728,7 @@
       </p:par>
     </p:tnLst>
     <p:bldLst>
+      <p:bldP spid="4" grpId="0"/>
       <p:bldP spid="2" grpId="0" animBg="1"/>
       <p:bldP spid="24" grpId="0" animBg="1"/>
     </p:bldLst>
@@ -24704,7 +24854,7 @@
           <a:graphicData uri="http://schemas.openxmlformats.org/presentationml/2006/ole">
             <mc:AlternateContent xmlns:mc="http://schemas.openxmlformats.org/markup-compatibility/2006">
               <mc:Choice xmlns:v="urn:schemas-microsoft-com:vml" Requires="v">
-                <p:oleObj spid="_x0000_s3119" name="Equation" r:id="rId3" imgW="1663700" imgH="469900" progId="Equation.3">
+                <p:oleObj spid="_x0000_s3145" name="Equation" r:id="rId3" imgW="1663700" imgH="469900" progId="Equation.3">
                   <p:embed/>
                 </p:oleObj>
               </mc:Choice>
@@ -24791,12 +24941,12 @@
             <a:effectLst/>
             <a:extLst>
               <a:ext uri="{909E8E84-426E-40dd-AFC4-6F175D3DCCD1}">
-                <a14:hiddenFill xmlns:a14="http://schemas.microsoft.com/office/drawing/2010/main" xmlns="">
+                <a14:hiddenFill xmlns="" xmlns:a14="http://schemas.microsoft.com/office/drawing/2010/main">
                   <a:noFill/>
                 </a14:hiddenFill>
               </a:ext>
               <a:ext uri="{AF507438-7753-43e0-B8FC-AC1667EBCBE1}">
-                <a14:hiddenEffects xmlns:a14="http://schemas.microsoft.com/office/drawing/2010/main" xmlns="">
+                <a14:hiddenEffects xmlns="" xmlns:a14="http://schemas.microsoft.com/office/drawing/2010/main">
                   <a:effectLst>
                     <a:outerShdw blurRad="63500" dist="38099" dir="2700000" algn="ctr" rotWithShape="0">
                       <a:schemeClr val="bg2">
@@ -24839,14 +24989,14 @@
             <a:effectLst/>
             <a:extLst>
               <a:ext uri="{909E8E84-426E-40dd-AFC4-6F175D3DCCD1}">
-                <a14:hiddenFill xmlns:a14="http://schemas.microsoft.com/office/drawing/2010/main" xmlns="">
+                <a14:hiddenFill xmlns="" xmlns:a14="http://schemas.microsoft.com/office/drawing/2010/main">
                   <a:solidFill>
                     <a:schemeClr val="accent1"/>
                   </a:solidFill>
                 </a14:hiddenFill>
               </a:ext>
               <a:ext uri="{91240B29-F687-4f45-9708-019B960494DF}">
-                <a14:hiddenLine xmlns:a14="http://schemas.microsoft.com/office/drawing/2010/main" xmlns="" w="9525">
+                <a14:hiddenLine xmlns="" xmlns:a14="http://schemas.microsoft.com/office/drawing/2010/main" w="9525">
                   <a:solidFill>
                     <a:schemeClr val="tx1"/>
                   </a:solidFill>
@@ -24856,7 +25006,7 @@
                 </a14:hiddenLine>
               </a:ext>
               <a:ext uri="{AF507438-7753-43e0-B8FC-AC1667EBCBE1}">
-                <a14:hiddenEffects xmlns:a14="http://schemas.microsoft.com/office/drawing/2010/main" xmlns="">
+                <a14:hiddenEffects xmlns="" xmlns:a14="http://schemas.microsoft.com/office/drawing/2010/main">
                   <a:effectLst>
                     <a:outerShdw blurRad="63500" dist="38099" dir="2700000" algn="ctr" rotWithShape="0">
                       <a:schemeClr val="bg2">
@@ -24909,7 +25059,7 @@
             <a:effectLst/>
             <a:extLst>
               <a:ext uri="{AF507438-7753-43e0-B8FC-AC1667EBCBE1}">
-                <a14:hiddenEffects xmlns:a14="http://schemas.microsoft.com/office/drawing/2010/main" xmlns="">
+                <a14:hiddenEffects xmlns="" xmlns:a14="http://schemas.microsoft.com/office/drawing/2010/main">
                   <a:effectLst>
                     <a:outerShdw blurRad="63500" dist="38099" dir="2700000" algn="ctr" rotWithShape="0">
                       <a:schemeClr val="bg2">
@@ -24965,7 +25115,7 @@
             <a:effectLst/>
             <a:extLst>
               <a:ext uri="{AF507438-7753-43e0-B8FC-AC1667EBCBE1}">
-                <a14:hiddenEffects xmlns:a14="http://schemas.microsoft.com/office/drawing/2010/main" xmlns="">
+                <a14:hiddenEffects xmlns="" xmlns:a14="http://schemas.microsoft.com/office/drawing/2010/main">
                   <a:effectLst>
                     <a:outerShdw blurRad="63500" dist="38099" dir="2700000" algn="ctr" rotWithShape="0">
                       <a:schemeClr val="bg2">
@@ -25021,7 +25171,7 @@
             <a:effectLst/>
             <a:extLst>
               <a:ext uri="{AF507438-7753-43e0-B8FC-AC1667EBCBE1}">
-                <a14:hiddenEffects xmlns:a14="http://schemas.microsoft.com/office/drawing/2010/main" xmlns="">
+                <a14:hiddenEffects xmlns="" xmlns:a14="http://schemas.microsoft.com/office/drawing/2010/main">
                   <a:effectLst>
                     <a:outerShdw blurRad="63500" dist="38099" dir="2700000" algn="ctr" rotWithShape="0">
                       <a:schemeClr val="bg2">
@@ -25077,7 +25227,7 @@
             <a:effectLst/>
             <a:extLst>
               <a:ext uri="{AF507438-7753-43e0-B8FC-AC1667EBCBE1}">
-                <a14:hiddenEffects xmlns:a14="http://schemas.microsoft.com/office/drawing/2010/main" xmlns="">
+                <a14:hiddenEffects xmlns="" xmlns:a14="http://schemas.microsoft.com/office/drawing/2010/main">
                   <a:effectLst>
                     <a:outerShdw blurRad="63500" dist="38099" dir="2700000" algn="ctr" rotWithShape="0">
                       <a:schemeClr val="bg2">
@@ -25132,12 +25282,12 @@
             <a:effectLst/>
             <a:extLst>
               <a:ext uri="{909E8E84-426E-40dd-AFC4-6F175D3DCCD1}">
-                <a14:hiddenFill xmlns:a14="http://schemas.microsoft.com/office/drawing/2010/main" xmlns="">
+                <a14:hiddenFill xmlns="" xmlns:a14="http://schemas.microsoft.com/office/drawing/2010/main">
                   <a:noFill/>
                 </a14:hiddenFill>
               </a:ext>
               <a:ext uri="{AF507438-7753-43e0-B8FC-AC1667EBCBE1}">
-                <a14:hiddenEffects xmlns:a14="http://schemas.microsoft.com/office/drawing/2010/main" xmlns="">
+                <a14:hiddenEffects xmlns="" xmlns:a14="http://schemas.microsoft.com/office/drawing/2010/main">
                   <a:effectLst>
                     <a:outerShdw blurRad="63500" dist="38099" dir="2700000" algn="ctr" rotWithShape="0">
                       <a:schemeClr val="bg2">
@@ -25194,14 +25344,14 @@
           <a:effectLst/>
           <a:extLst>
             <a:ext uri="{909E8E84-426E-40dd-AFC4-6F175D3DCCD1}">
-              <a14:hiddenFill xmlns:a14="http://schemas.microsoft.com/office/drawing/2010/main" xmlns="">
+              <a14:hiddenFill xmlns="" xmlns:a14="http://schemas.microsoft.com/office/drawing/2010/main">
                 <a:solidFill>
                   <a:schemeClr val="accent1"/>
                 </a:solidFill>
               </a14:hiddenFill>
             </a:ext>
             <a:ext uri="{91240B29-F687-4f45-9708-019B960494DF}">
-              <a14:hiddenLine xmlns:a14="http://schemas.microsoft.com/office/drawing/2010/main" xmlns="" w="9525">
+              <a14:hiddenLine xmlns="" xmlns:a14="http://schemas.microsoft.com/office/drawing/2010/main" w="9525">
                 <a:solidFill>
                   <a:schemeClr val="tx1"/>
                 </a:solidFill>
@@ -25211,7 +25361,7 @@
               </a14:hiddenLine>
             </a:ext>
             <a:ext uri="{AF507438-7753-43e0-B8FC-AC1667EBCBE1}">
-              <a14:hiddenEffects xmlns:a14="http://schemas.microsoft.com/office/drawing/2010/main" xmlns="">
+              <a14:hiddenEffects xmlns="" xmlns:a14="http://schemas.microsoft.com/office/drawing/2010/main">
                 <a:effectLst>
                   <a:outerShdw blurRad="63500" dist="38099" dir="2700000" algn="ctr" rotWithShape="0">
                     <a:schemeClr val="bg2">
@@ -25260,14 +25410,14 @@
           <a:effectLst/>
           <a:extLst>
             <a:ext uri="{909E8E84-426E-40dd-AFC4-6F175D3DCCD1}">
-              <a14:hiddenFill xmlns:a14="http://schemas.microsoft.com/office/drawing/2010/main" xmlns="">
+              <a14:hiddenFill xmlns="" xmlns:a14="http://schemas.microsoft.com/office/drawing/2010/main">
                 <a:solidFill>
                   <a:schemeClr val="accent1"/>
                 </a:solidFill>
               </a14:hiddenFill>
             </a:ext>
             <a:ext uri="{91240B29-F687-4f45-9708-019B960494DF}">
-              <a14:hiddenLine xmlns:a14="http://schemas.microsoft.com/office/drawing/2010/main" xmlns="" w="9525">
+              <a14:hiddenLine xmlns="" xmlns:a14="http://schemas.microsoft.com/office/drawing/2010/main" w="9525">
                 <a:solidFill>
                   <a:schemeClr val="tx1"/>
                 </a:solidFill>
@@ -25277,7 +25427,7 @@
               </a14:hiddenLine>
             </a:ext>
             <a:ext uri="{AF507438-7753-43e0-B8FC-AC1667EBCBE1}">
-              <a14:hiddenEffects xmlns:a14="http://schemas.microsoft.com/office/drawing/2010/main" xmlns="">
+              <a14:hiddenEffects xmlns="" xmlns:a14="http://schemas.microsoft.com/office/drawing/2010/main">
                 <a:effectLst>
                   <a:outerShdw blurRad="63500" dist="38099" dir="2700000" algn="ctr" rotWithShape="0">
                     <a:schemeClr val="bg2">
@@ -25896,7 +26046,11 @@
             <a:pPr lvl="1"/>
             <a:r>
               <a:rPr lang="en-US" dirty="0"/>
-              <a:t>~ 2 x 10-12</a:t>
+              <a:t>~ 2 x 10</a:t>
+            </a:r>
+            <a:r>
+              <a:rPr lang="en-US" baseline="30000" dirty="0"/>
+              <a:t>-12</a:t>
             </a:r>
           </a:p>
           <a:p>
@@ -25954,7 +26108,7 @@
           <a:graphicData uri="http://schemas.openxmlformats.org/presentationml/2006/ole">
             <mc:AlternateContent xmlns:mc="http://schemas.openxmlformats.org/markup-compatibility/2006">
               <mc:Choice xmlns:v="urn:schemas-microsoft-com:vml" Requires="v">
-                <p:oleObj spid="_x0000_s4143" name="Equation" r:id="rId3" imgW="1663700" imgH="469900" progId="Equation.3">
+                <p:oleObj spid="_x0000_s4169" name="Equation" r:id="rId3" imgW="1663700" imgH="469900" progId="Equation.3">
                   <p:embed/>
                 </p:oleObj>
               </mc:Choice>
@@ -26181,15 +26335,33 @@
                                   </p:childTnLst>
                                 </p:cTn>
                               </p:par>
+                            </p:childTnLst>
+                          </p:cTn>
+                        </p:par>
+                      </p:childTnLst>
+                    </p:cTn>
+                  </p:par>
+                  <p:par>
+                    <p:cTn id="11" fill="hold">
+                      <p:stCondLst>
+                        <p:cond delay="indefinite"/>
+                      </p:stCondLst>
+                      <p:childTnLst>
+                        <p:par>
+                          <p:cTn id="12" fill="hold">
+                            <p:stCondLst>
+                              <p:cond delay="0"/>
+                            </p:stCondLst>
+                            <p:childTnLst>
                               <p:par>
-                                <p:cTn id="11" presetID="1" presetClass="entr" presetSubtype="0" fill="hold" grpId="0" nodeType="withEffect">
+                                <p:cTn id="13" presetID="1" presetClass="entr" presetSubtype="0" fill="hold" grpId="0" nodeType="clickEffect">
                                   <p:stCondLst>
                                     <p:cond delay="0"/>
                                   </p:stCondLst>
                                   <p:childTnLst>
                                     <p:set>
                                       <p:cBhvr>
-                                        <p:cTn id="12" dur="1" fill="hold">
+                                        <p:cTn id="14" dur="1" fill="hold">
                                           <p:stCondLst>
                                             <p:cond delay="0"/>
                                           </p:stCondLst>
@@ -26219,50 +26391,19 @@
                     </p:cTn>
                   </p:par>
                   <p:par>
-                    <p:cTn id="13" fill="hold">
+                    <p:cTn id="15" fill="hold">
                       <p:stCondLst>
                         <p:cond delay="indefinite"/>
                       </p:stCondLst>
                       <p:childTnLst>
                         <p:par>
-                          <p:cTn id="14" fill="hold">
+                          <p:cTn id="16" fill="hold">
                             <p:stCondLst>
                               <p:cond delay="0"/>
                             </p:stCondLst>
                             <p:childTnLst>
                               <p:par>
-                                <p:cTn id="15" presetID="1" presetClass="entr" presetSubtype="0" fill="hold" grpId="0" nodeType="clickEffect">
-                                  <p:stCondLst>
-                                    <p:cond delay="0"/>
-                                  </p:stCondLst>
-                                  <p:childTnLst>
-                                    <p:set>
-                                      <p:cBhvr>
-                                        <p:cTn id="16" dur="1" fill="hold">
-                                          <p:stCondLst>
-                                            <p:cond delay="0"/>
-                                          </p:stCondLst>
-                                        </p:cTn>
-                                        <p:tgtEl>
-                                          <p:spTgt spid="3">
-                                            <p:txEl>
-                                              <p:pRg st="3" end="3"/>
-                                            </p:txEl>
-                                          </p:spTgt>
-                                        </p:tgtEl>
-                                        <p:attrNameLst>
-                                          <p:attrName>style.visibility</p:attrName>
-                                        </p:attrNameLst>
-                                      </p:cBhvr>
-                                      <p:to>
-                                        <p:strVal val="visible"/>
-                                      </p:to>
-                                    </p:set>
-                                  </p:childTnLst>
-                                </p:cTn>
-                              </p:par>
-                              <p:par>
-                                <p:cTn id="17" presetID="1" presetClass="entr" presetSubtype="0" fill="hold" grpId="0" nodeType="withEffect">
+                                <p:cTn id="17" presetID="1" presetClass="entr" presetSubtype="0" fill="hold" grpId="0" nodeType="clickEffect">
                                   <p:stCondLst>
                                     <p:cond delay="0"/>
                                   </p:stCondLst>
@@ -26277,7 +26418,7 @@
                                         <p:tgtEl>
                                           <p:spTgt spid="3">
                                             <p:txEl>
-                                              <p:pRg st="4" end="4"/>
+                                              <p:pRg st="3" end="3"/>
                                             </p:txEl>
                                           </p:spTgt>
                                         </p:tgtEl>
@@ -26326,6 +26467,55 @@
                                         <p:tgtEl>
                                           <p:spTgt spid="3">
                                             <p:txEl>
+                                              <p:pRg st="4" end="4"/>
+                                            </p:txEl>
+                                          </p:spTgt>
+                                        </p:tgtEl>
+                                        <p:attrNameLst>
+                                          <p:attrName>style.visibility</p:attrName>
+                                        </p:attrNameLst>
+                                      </p:cBhvr>
+                                      <p:to>
+                                        <p:strVal val="visible"/>
+                                      </p:to>
+                                    </p:set>
+                                  </p:childTnLst>
+                                </p:cTn>
+                              </p:par>
+                            </p:childTnLst>
+                          </p:cTn>
+                        </p:par>
+                      </p:childTnLst>
+                    </p:cTn>
+                  </p:par>
+                  <p:par>
+                    <p:cTn id="23" fill="hold">
+                      <p:stCondLst>
+                        <p:cond delay="indefinite"/>
+                      </p:stCondLst>
+                      <p:childTnLst>
+                        <p:par>
+                          <p:cTn id="24" fill="hold">
+                            <p:stCondLst>
+                              <p:cond delay="0"/>
+                            </p:stCondLst>
+                            <p:childTnLst>
+                              <p:par>
+                                <p:cTn id="25" presetID="1" presetClass="entr" presetSubtype="0" fill="hold" grpId="0" nodeType="clickEffect">
+                                  <p:stCondLst>
+                                    <p:cond delay="0"/>
+                                  </p:stCondLst>
+                                  <p:childTnLst>
+                                    <p:set>
+                                      <p:cBhvr>
+                                        <p:cTn id="26" dur="1" fill="hold">
+                                          <p:stCondLst>
+                                            <p:cond delay="0"/>
+                                          </p:stCondLst>
+                                        </p:cTn>
+                                        <p:tgtEl>
+                                          <p:spTgt spid="3">
+                                            <p:txEl>
                                               <p:pRg st="5" end="5"/>
                                             </p:txEl>
                                           </p:spTgt>
@@ -26341,15 +26531,33 @@
                                   </p:childTnLst>
                                 </p:cTn>
                               </p:par>
+                            </p:childTnLst>
+                          </p:cTn>
+                        </p:par>
+                      </p:childTnLst>
+                    </p:cTn>
+                  </p:par>
+                  <p:par>
+                    <p:cTn id="27" fill="hold">
+                      <p:stCondLst>
+                        <p:cond delay="indefinite"/>
+                      </p:stCondLst>
+                      <p:childTnLst>
+                        <p:par>
+                          <p:cTn id="28" fill="hold">
+                            <p:stCondLst>
+                              <p:cond delay="0"/>
+                            </p:stCondLst>
+                            <p:childTnLst>
                               <p:par>
-                                <p:cTn id="23" presetID="1" presetClass="entr" presetSubtype="0" fill="hold" grpId="0" nodeType="withEffect">
+                                <p:cTn id="29" presetID="1" presetClass="entr" presetSubtype="0" fill="hold" grpId="0" nodeType="clickEffect">
                                   <p:stCondLst>
                                     <p:cond delay="0"/>
                                   </p:stCondLst>
                                   <p:childTnLst>
                                     <p:set>
                                       <p:cBhvr>
-                                        <p:cTn id="24" dur="1" fill="hold">
+                                        <p:cTn id="30" dur="1" fill="hold">
                                           <p:stCondLst>
                                             <p:cond delay="0"/>
                                           </p:stCondLst>
@@ -26400,7 +26608,7 @@
       </p:par>
     </p:tnLst>
     <p:bldLst>
-      <p:bldP spid="3" grpId="0" build="p"/>
+      <p:bldP spid="3" grpId="0" uiExpand="1" build="p"/>
     </p:bldLst>
   </p:timing>
 </p:sld>
@@ -26495,7 +26703,19 @@
             <a:pPr lvl="1"/>
             <a:r>
               <a:rPr lang="en-US" dirty="0"/>
-              <a:t>Restrict window to min{RWND, CWND} to make sure that neither the receiver nor the network are overwhelmed</a:t>
+              <a:t>Restrict window to </a:t>
+            </a:r>
+            <a:r>
+              <a:rPr lang="en-US" dirty="0">
+                <a:solidFill>
+                  <a:srgbClr val="0000FF"/>
+                </a:solidFill>
+              </a:rPr>
+              <a:t>min{RWND, CWND}</a:t>
+            </a:r>
+            <a:r>
+              <a:rPr lang="en-US" dirty="0"/>
+              <a:t> to make sure that neither the receiver nor the network are overwhelmed</a:t>
             </a:r>
           </a:p>
         </p:txBody>
@@ -26920,7 +27140,23 @@
             <a:pPr lvl="1"/>
             <a:r>
               <a:rPr lang="en-US" dirty="0"/>
-              <a:t>A proposed standard [Floyd’03]: once speed is past some threshold, change equation to p-.8 rather than p-.5 </a:t>
+              <a:t>A proposed standard [Floyd’03]: once speed is past some threshold, change equation to p</a:t>
+            </a:r>
+            <a:r>
+              <a:rPr lang="en-US" baseline="30000" dirty="0"/>
+              <a:t>-.8</a:t>
+            </a:r>
+            <a:r>
+              <a:rPr lang="en-US" dirty="0"/>
+              <a:t> rather than p</a:t>
+            </a:r>
+            <a:r>
+              <a:rPr lang="en-US" baseline="30000" dirty="0"/>
+              <a:t>-.5</a:t>
+            </a:r>
+            <a:r>
+              <a:rPr lang="en-US" dirty="0"/>
+              <a:t> </a:t>
             </a:r>
           </a:p>
           <a:p>
@@ -27347,7 +27583,7 @@
           <a:graphicData uri="http://schemas.openxmlformats.org/presentationml/2006/ole">
             <mc:AlternateContent xmlns:mc="http://schemas.openxmlformats.org/markup-compatibility/2006">
               <mc:Choice xmlns:v="urn:schemas-microsoft-com:vml" Requires="v">
-                <p:oleObj spid="_x0000_s5167" name="Equation" r:id="rId3" imgW="1663700" imgH="469900" progId="Equation.3">
+                <p:oleObj spid="_x0000_s5193" name="Equation" r:id="rId3" imgW="1663700" imgH="469900" progId="Equation.3">
                   <p:embed/>
                 </p:oleObj>
               </mc:Choice>
@@ -29739,7 +29975,7 @@
             <a:pPr lvl="1"/>
             <a:r>
               <a:rPr lang="en-US" dirty="0"/>
-              <a:t> A starts 10 connections to B</a:t>
+              <a:t>A starts 10 connections to B</a:t>
             </a:r>
           </a:p>
           <a:p>
@@ -29793,14 +30029,14 @@
           </a:ln>
           <a:extLst>
             <a:ext uri="{909E8E84-426E-40dd-AFC4-6F175D3DCCD1}">
-              <a14:hiddenFill xmlns:a14="http://schemas.microsoft.com/office/drawing/2010/main" xmlns="">
+              <a14:hiddenFill xmlns="" xmlns:a14="http://schemas.microsoft.com/office/drawing/2010/main">
                 <a:solidFill>
                   <a:srgbClr val="FFFFFF"/>
                 </a:solidFill>
               </a14:hiddenFill>
             </a:ext>
             <a:ext uri="{91240B29-F687-4f45-9708-019B960494DF}">
-              <a14:hiddenLine xmlns:a14="http://schemas.microsoft.com/office/drawing/2010/main" xmlns="" w="9525">
+              <a14:hiddenLine xmlns="" xmlns:a14="http://schemas.microsoft.com/office/drawing/2010/main" w="9525">
                 <a:solidFill>
                   <a:srgbClr val="000000"/>
                 </a:solidFill>
@@ -29865,7 +30101,7 @@
             <a:effectLst/>
             <a:extLst>
               <a:ext uri="{AF507438-7753-43e0-B8FC-AC1667EBCBE1}">
-                <a14:hiddenEffects xmlns:a14="http://schemas.microsoft.com/office/drawing/2010/main" xmlns="">
+                <a14:hiddenEffects xmlns="" xmlns:a14="http://schemas.microsoft.com/office/drawing/2010/main">
                   <a:effectLst>
                     <a:outerShdw blurRad="63500" dist="38099" dir="2700000" algn="ctr" rotWithShape="0">
                       <a:schemeClr val="bg2">
@@ -29924,7 +30160,7 @@
             <a:effectLst/>
             <a:extLst>
               <a:ext uri="{AF507438-7753-43e0-B8FC-AC1667EBCBE1}">
-                <a14:hiddenEffects xmlns:a14="http://schemas.microsoft.com/office/drawing/2010/main" xmlns="">
+                <a14:hiddenEffects xmlns="" xmlns:a14="http://schemas.microsoft.com/office/drawing/2010/main">
                   <a:effectLst>
                     <a:outerShdw blurRad="63500" dist="38099" dir="2700000" algn="ctr" rotWithShape="0">
                       <a:schemeClr val="bg2">
@@ -29979,7 +30215,7 @@
             <a:effectLst/>
             <a:extLst>
               <a:ext uri="{AF507438-7753-43e0-B8FC-AC1667EBCBE1}">
-                <a14:hiddenEffects xmlns:a14="http://schemas.microsoft.com/office/drawing/2010/main" xmlns="">
+                <a14:hiddenEffects xmlns="" xmlns:a14="http://schemas.microsoft.com/office/drawing/2010/main">
                   <a:effectLst>
                     <a:outerShdw blurRad="63500" dist="38099" dir="2700000" algn="ctr" rotWithShape="0">
                       <a:schemeClr val="bg2">
@@ -30036,12 +30272,12 @@
             <a:effectLst/>
             <a:extLst>
               <a:ext uri="{909E8E84-426E-40dd-AFC4-6F175D3DCCD1}">
-                <a14:hiddenFill xmlns:a14="http://schemas.microsoft.com/office/drawing/2010/main" xmlns="">
+                <a14:hiddenFill xmlns="" xmlns:a14="http://schemas.microsoft.com/office/drawing/2010/main">
                   <a:noFill/>
                 </a14:hiddenFill>
               </a:ext>
               <a:ext uri="{AF507438-7753-43e0-B8FC-AC1667EBCBE1}">
-                <a14:hiddenEffects xmlns:a14="http://schemas.microsoft.com/office/drawing/2010/main" xmlns="">
+                <a14:hiddenEffects xmlns="" xmlns:a14="http://schemas.microsoft.com/office/drawing/2010/main">
                   <a:effectLst>
                     <a:outerShdw blurRad="63500" dist="38099" dir="2700000" algn="ctr" rotWithShape="0">
                       <a:schemeClr val="bg2">
@@ -30094,12 +30330,12 @@
             <a:effectLst/>
             <a:extLst>
               <a:ext uri="{909E8E84-426E-40dd-AFC4-6F175D3DCCD1}">
-                <a14:hiddenFill xmlns:a14="http://schemas.microsoft.com/office/drawing/2010/main" xmlns="">
+                <a14:hiddenFill xmlns="" xmlns:a14="http://schemas.microsoft.com/office/drawing/2010/main">
                   <a:noFill/>
                 </a14:hiddenFill>
               </a:ext>
               <a:ext uri="{AF507438-7753-43e0-B8FC-AC1667EBCBE1}">
-                <a14:hiddenEffects xmlns:a14="http://schemas.microsoft.com/office/drawing/2010/main" xmlns="">
+                <a14:hiddenEffects xmlns="" xmlns:a14="http://schemas.microsoft.com/office/drawing/2010/main">
                   <a:effectLst>
                     <a:outerShdw blurRad="63500" dist="38099" dir="2700000" algn="ctr" rotWithShape="0">
                       <a:schemeClr val="bg2">
@@ -30147,14 +30383,14 @@
             <a:effectLst/>
             <a:extLst>
               <a:ext uri="{909E8E84-426E-40dd-AFC4-6F175D3DCCD1}">
-                <a14:hiddenFill xmlns:a14="http://schemas.microsoft.com/office/drawing/2010/main" xmlns="">
+                <a14:hiddenFill xmlns="" xmlns:a14="http://schemas.microsoft.com/office/drawing/2010/main">
                   <a:solidFill>
                     <a:schemeClr val="accent1"/>
                   </a:solidFill>
                 </a14:hiddenFill>
               </a:ext>
               <a:ext uri="{91240B29-F687-4f45-9708-019B960494DF}">
-                <a14:hiddenLine xmlns:a14="http://schemas.microsoft.com/office/drawing/2010/main" xmlns="" w="9525">
+                <a14:hiddenLine xmlns="" xmlns:a14="http://schemas.microsoft.com/office/drawing/2010/main" w="9525">
                   <a:solidFill>
                     <a:schemeClr val="tx1"/>
                   </a:solidFill>
@@ -30164,7 +30400,7 @@
                 </a14:hiddenLine>
               </a:ext>
               <a:ext uri="{AF507438-7753-43e0-B8FC-AC1667EBCBE1}">
-                <a14:hiddenEffects xmlns:a14="http://schemas.microsoft.com/office/drawing/2010/main" xmlns="">
+                <a14:hiddenEffects xmlns="" xmlns:a14="http://schemas.microsoft.com/office/drawing/2010/main">
                   <a:effectLst>
                     <a:outerShdw blurRad="63500" dist="38099" dir="2700000" algn="ctr" rotWithShape="0">
                       <a:schemeClr val="bg2">
@@ -30319,14 +30555,14 @@
             <a:effectLst/>
             <a:extLst>
               <a:ext uri="{909E8E84-426E-40dd-AFC4-6F175D3DCCD1}">
-                <a14:hiddenFill xmlns:a14="http://schemas.microsoft.com/office/drawing/2010/main" xmlns="">
+                <a14:hiddenFill xmlns="" xmlns:a14="http://schemas.microsoft.com/office/drawing/2010/main">
                   <a:solidFill>
                     <a:schemeClr val="accent1"/>
                   </a:solidFill>
                 </a14:hiddenFill>
               </a:ext>
               <a:ext uri="{91240B29-F687-4f45-9708-019B960494DF}">
-                <a14:hiddenLine xmlns:a14="http://schemas.microsoft.com/office/drawing/2010/main" xmlns="" w="9525">
+                <a14:hiddenLine xmlns="" xmlns:a14="http://schemas.microsoft.com/office/drawing/2010/main" w="9525">
                   <a:solidFill>
                     <a:schemeClr val="tx1"/>
                   </a:solidFill>
@@ -30336,7 +30572,7 @@
                 </a14:hiddenLine>
               </a:ext>
               <a:ext uri="{AF507438-7753-43e0-B8FC-AC1667EBCBE1}">
-                <a14:hiddenEffects xmlns:a14="http://schemas.microsoft.com/office/drawing/2010/main" xmlns="">
+                <a14:hiddenEffects xmlns="" xmlns:a14="http://schemas.microsoft.com/office/drawing/2010/main">
                   <a:effectLst>
                     <a:outerShdw blurRad="63500" dist="38099" dir="2700000" algn="ctr" rotWithShape="0">
                       <a:schemeClr val="bg2">
@@ -30504,7 +30740,7 @@
             <a:effectLst/>
             <a:extLst>
               <a:ext uri="{AF507438-7753-43e0-B8FC-AC1667EBCBE1}">
-                <a14:hiddenEffects xmlns:a14="http://schemas.microsoft.com/office/drawing/2010/main" xmlns="">
+                <a14:hiddenEffects xmlns="" xmlns:a14="http://schemas.microsoft.com/office/drawing/2010/main">
                   <a:effectLst>
                     <a:outerShdw blurRad="63500" dist="38099" dir="2700000" algn="ctr" rotWithShape="0">
                       <a:schemeClr val="bg2">
@@ -30563,7 +30799,7 @@
             <a:effectLst/>
             <a:extLst>
               <a:ext uri="{AF507438-7753-43e0-B8FC-AC1667EBCBE1}">
-                <a14:hiddenEffects xmlns:a14="http://schemas.microsoft.com/office/drawing/2010/main" xmlns="">
+                <a14:hiddenEffects xmlns="" xmlns:a14="http://schemas.microsoft.com/office/drawing/2010/main">
                   <a:effectLst>
                     <a:outerShdw blurRad="63500" dist="38099" dir="2700000" algn="ctr" rotWithShape="0">
                       <a:schemeClr val="bg2">
@@ -30620,12 +30856,12 @@
             <a:effectLst/>
             <a:extLst>
               <a:ext uri="{909E8E84-426E-40dd-AFC4-6F175D3DCCD1}">
-                <a14:hiddenFill xmlns:a14="http://schemas.microsoft.com/office/drawing/2010/main" xmlns="">
+                <a14:hiddenFill xmlns="" xmlns:a14="http://schemas.microsoft.com/office/drawing/2010/main">
                   <a:noFill/>
                 </a14:hiddenFill>
               </a:ext>
               <a:ext uri="{AF507438-7753-43e0-B8FC-AC1667EBCBE1}">
-                <a14:hiddenEffects xmlns:a14="http://schemas.microsoft.com/office/drawing/2010/main" xmlns="">
+                <a14:hiddenEffects xmlns="" xmlns:a14="http://schemas.microsoft.com/office/drawing/2010/main">
                   <a:effectLst>
                     <a:outerShdw blurRad="63500" dist="38099" dir="2700000" algn="ctr" rotWithShape="0">
                       <a:schemeClr val="bg2">
@@ -30678,12 +30914,12 @@
             <a:effectLst/>
             <a:extLst>
               <a:ext uri="{909E8E84-426E-40dd-AFC4-6F175D3DCCD1}">
-                <a14:hiddenFill xmlns:a14="http://schemas.microsoft.com/office/drawing/2010/main" xmlns="">
+                <a14:hiddenFill xmlns="" xmlns:a14="http://schemas.microsoft.com/office/drawing/2010/main">
                   <a:noFill/>
                 </a14:hiddenFill>
               </a:ext>
               <a:ext uri="{AF507438-7753-43e0-B8FC-AC1667EBCBE1}">
-                <a14:hiddenEffects xmlns:a14="http://schemas.microsoft.com/office/drawing/2010/main" xmlns="">
+                <a14:hiddenEffects xmlns="" xmlns:a14="http://schemas.microsoft.com/office/drawing/2010/main">
                   <a:effectLst>
                     <a:outerShdw blurRad="63500" dist="38099" dir="2700000" algn="ctr" rotWithShape="0">
                       <a:schemeClr val="bg2">
@@ -30731,14 +30967,14 @@
             <a:effectLst/>
             <a:extLst>
               <a:ext uri="{909E8E84-426E-40dd-AFC4-6F175D3DCCD1}">
-                <a14:hiddenFill xmlns:a14="http://schemas.microsoft.com/office/drawing/2010/main" xmlns="">
+                <a14:hiddenFill xmlns="" xmlns:a14="http://schemas.microsoft.com/office/drawing/2010/main">
                   <a:solidFill>
                     <a:schemeClr val="accent1"/>
                   </a:solidFill>
                 </a14:hiddenFill>
               </a:ext>
               <a:ext uri="{91240B29-F687-4f45-9708-019B960494DF}">
-                <a14:hiddenLine xmlns:a14="http://schemas.microsoft.com/office/drawing/2010/main" xmlns="" w="9525">
+                <a14:hiddenLine xmlns="" xmlns:a14="http://schemas.microsoft.com/office/drawing/2010/main" w="9525">
                   <a:solidFill>
                     <a:schemeClr val="tx1"/>
                   </a:solidFill>
@@ -30748,7 +30984,7 @@
                 </a14:hiddenLine>
               </a:ext>
               <a:ext uri="{AF507438-7753-43e0-B8FC-AC1667EBCBE1}">
-                <a14:hiddenEffects xmlns:a14="http://schemas.microsoft.com/office/drawing/2010/main" xmlns="">
+                <a14:hiddenEffects xmlns="" xmlns:a14="http://schemas.microsoft.com/office/drawing/2010/main">
                   <a:effectLst>
                     <a:outerShdw blurRad="63500" dist="38099" dir="2700000" algn="ctr" rotWithShape="0">
                       <a:schemeClr val="bg2">
@@ -30903,14 +31139,14 @@
             <a:effectLst/>
             <a:extLst>
               <a:ext uri="{909E8E84-426E-40dd-AFC4-6F175D3DCCD1}">
-                <a14:hiddenFill xmlns:a14="http://schemas.microsoft.com/office/drawing/2010/main" xmlns="">
+                <a14:hiddenFill xmlns="" xmlns:a14="http://schemas.microsoft.com/office/drawing/2010/main">
                   <a:solidFill>
                     <a:schemeClr val="accent1"/>
                   </a:solidFill>
                 </a14:hiddenFill>
               </a:ext>
               <a:ext uri="{91240B29-F687-4f45-9708-019B960494DF}">
-                <a14:hiddenLine xmlns:a14="http://schemas.microsoft.com/office/drawing/2010/main" xmlns="" w="9525">
+                <a14:hiddenLine xmlns="" xmlns:a14="http://schemas.microsoft.com/office/drawing/2010/main" w="9525">
                   <a:solidFill>
                     <a:schemeClr val="tx1"/>
                   </a:solidFill>
@@ -30920,7 +31156,7 @@
                 </a14:hiddenLine>
               </a:ext>
               <a:ext uri="{AF507438-7753-43e0-B8FC-AC1667EBCBE1}">
-                <a14:hiddenEffects xmlns:a14="http://schemas.microsoft.com/office/drawing/2010/main" xmlns="">
+                <a14:hiddenEffects xmlns="" xmlns:a14="http://schemas.microsoft.com/office/drawing/2010/main">
                   <a:effectLst>
                     <a:outerShdw blurRad="63500" dist="38099" dir="2700000" algn="ctr" rotWithShape="0">
                       <a:schemeClr val="bg2">
@@ -33959,21 +34195,37 @@
           </a:p>
           <a:p>
             <a:r>
-              <a:rPr lang="en-US">
-                <a:solidFill>
-                  <a:srgbClr val="0000FF"/>
-                </a:solidFill>
-              </a:rPr>
-              <a:t>Next few weeks</a:t>
-            </a:r>
-            <a:r>
               <a:rPr lang="en-US" dirty="0">
                 <a:solidFill>
                   <a:srgbClr val="0000FF"/>
                 </a:solidFill>
               </a:rPr>
-              <a:t>: The Network Layer</a:t>
-            </a:r>
+              <a:t>Next few weeks: The Network Layer</a:t>
+            </a:r>
+          </a:p>
+          <a:p>
+            <a:endParaRPr lang="en-US" dirty="0">
+              <a:solidFill>
+                <a:srgbClr val="0000FF"/>
+              </a:solidFill>
+            </a:endParaRPr>
+          </a:p>
+          <a:p>
+            <a:r>
+              <a:rPr lang="en-US" dirty="0">
+                <a:solidFill>
+                  <a:srgbClr val="0000FF"/>
+                </a:solidFill>
+              </a:rPr>
+              <a:t>Next lecture on October 17</a:t>
+            </a:r>
+          </a:p>
+          <a:p>
+            <a:endParaRPr lang="en-US" dirty="0">
+              <a:solidFill>
+                <a:srgbClr val="0000FF"/>
+              </a:solidFill>
+            </a:endParaRPr>
           </a:p>
         </p:txBody>
       </p:sp>
@@ -34098,6 +34350,55 @@
                                           <p:spTgt spid="3">
                                             <p:txEl>
                                               <p:pRg st="3" end="3"/>
+                                            </p:txEl>
+                                          </p:spTgt>
+                                        </p:tgtEl>
+                                        <p:attrNameLst>
+                                          <p:attrName>style.visibility</p:attrName>
+                                        </p:attrNameLst>
+                                      </p:cBhvr>
+                                      <p:to>
+                                        <p:strVal val="visible"/>
+                                      </p:to>
+                                    </p:set>
+                                  </p:childTnLst>
+                                </p:cTn>
+                              </p:par>
+                            </p:childTnLst>
+                          </p:cTn>
+                        </p:par>
+                      </p:childTnLst>
+                    </p:cTn>
+                  </p:par>
+                  <p:par>
+                    <p:cTn id="7" fill="hold">
+                      <p:stCondLst>
+                        <p:cond delay="indefinite"/>
+                      </p:stCondLst>
+                      <p:childTnLst>
+                        <p:par>
+                          <p:cTn id="8" fill="hold">
+                            <p:stCondLst>
+                              <p:cond delay="0"/>
+                            </p:stCondLst>
+                            <p:childTnLst>
+                              <p:par>
+                                <p:cTn id="9" presetID="1" presetClass="entr" presetSubtype="0" fill="hold" nodeType="clickEffect">
+                                  <p:stCondLst>
+                                    <p:cond delay="0"/>
+                                  </p:stCondLst>
+                                  <p:childTnLst>
+                                    <p:set>
+                                      <p:cBhvr>
+                                        <p:cTn id="10" dur="1" fill="hold">
+                                          <p:stCondLst>
+                                            <p:cond delay="0"/>
+                                          </p:stCondLst>
+                                        </p:cTn>
+                                        <p:tgtEl>
+                                          <p:spTgt spid="3">
+                                            <p:txEl>
+                                              <p:pRg st="5" end="5"/>
                                             </p:txEl>
                                           </p:spTgt>
                                         </p:tgtEl>
@@ -36068,7 +36369,7 @@
           </a:ln>
           <a:extLst>
             <a:ext uri="{909E8E84-426E-40dd-AFC4-6F175D3DCCD1}">
-              <a14:hiddenFill xmlns:a14="http://schemas.microsoft.com/office/drawing/2010/main" xmlns="">
+              <a14:hiddenFill xmlns="" xmlns:a14="http://schemas.microsoft.com/office/drawing/2010/main">
                 <a:solidFill>
                   <a:srgbClr val="FFFFFF"/>
                 </a:solidFill>
@@ -36178,7 +36479,7 @@
           </a:ln>
           <a:extLst>
             <a:ext uri="{909E8E84-426E-40dd-AFC4-6F175D3DCCD1}">
-              <a14:hiddenFill xmlns:a14="http://schemas.microsoft.com/office/drawing/2010/main" xmlns="">
+              <a14:hiddenFill xmlns="" xmlns:a14="http://schemas.microsoft.com/office/drawing/2010/main">
                 <a:solidFill>
                   <a:srgbClr val="FFFFFF"/>
                 </a:solidFill>
@@ -36216,14 +36517,14 @@
           </a:ln>
           <a:extLst>
             <a:ext uri="{909E8E84-426E-40dd-AFC4-6F175D3DCCD1}">
-              <a14:hiddenFill xmlns:a14="http://schemas.microsoft.com/office/drawing/2010/main" xmlns="">
+              <a14:hiddenFill xmlns="" xmlns:a14="http://schemas.microsoft.com/office/drawing/2010/main">
                 <a:solidFill>
                   <a:srgbClr val="FFFFFF"/>
                 </a:solidFill>
               </a14:hiddenFill>
             </a:ext>
             <a:ext uri="{91240B29-F687-4f45-9708-019B960494DF}">
-              <a14:hiddenLine xmlns:a14="http://schemas.microsoft.com/office/drawing/2010/main" xmlns="" w="9525">
+              <a14:hiddenLine xmlns="" xmlns:a14="http://schemas.microsoft.com/office/drawing/2010/main" w="9525">
                 <a:solidFill>
                   <a:srgbClr val="000000"/>
                 </a:solidFill>
@@ -36379,14 +36680,14 @@
           </a:ln>
           <a:extLst>
             <a:ext uri="{909E8E84-426E-40dd-AFC4-6F175D3DCCD1}">
-              <a14:hiddenFill xmlns:a14="http://schemas.microsoft.com/office/drawing/2010/main" xmlns="">
+              <a14:hiddenFill xmlns="" xmlns:a14="http://schemas.microsoft.com/office/drawing/2010/main">
                 <a:solidFill>
                   <a:srgbClr val="FFFFFF"/>
                 </a:solidFill>
               </a14:hiddenFill>
             </a:ext>
             <a:ext uri="{91240B29-F687-4f45-9708-019B960494DF}">
-              <a14:hiddenLine xmlns:a14="http://schemas.microsoft.com/office/drawing/2010/main" xmlns="" w="9525">
+              <a14:hiddenLine xmlns="" xmlns:a14="http://schemas.microsoft.com/office/drawing/2010/main" w="9525">
                 <a:solidFill>
                   <a:srgbClr val="000000"/>
                 </a:solidFill>
@@ -36542,14 +36843,14 @@
           </a:ln>
           <a:extLst>
             <a:ext uri="{909E8E84-426E-40dd-AFC4-6F175D3DCCD1}">
-              <a14:hiddenFill xmlns:a14="http://schemas.microsoft.com/office/drawing/2010/main" xmlns="">
+              <a14:hiddenFill xmlns="" xmlns:a14="http://schemas.microsoft.com/office/drawing/2010/main">
                 <a:solidFill>
                   <a:srgbClr val="FFFFFF"/>
                 </a:solidFill>
               </a14:hiddenFill>
             </a:ext>
             <a:ext uri="{91240B29-F687-4f45-9708-019B960494DF}">
-              <a14:hiddenLine xmlns:a14="http://schemas.microsoft.com/office/drawing/2010/main" xmlns="" w="9525">
+              <a14:hiddenLine xmlns="" xmlns:a14="http://schemas.microsoft.com/office/drawing/2010/main" w="9525">
                 <a:solidFill>
                   <a:srgbClr val="000000"/>
                 </a:solidFill>
@@ -36778,7 +37079,7 @@
           </a:ln>
           <a:extLst>
             <a:ext uri="{909E8E84-426E-40dd-AFC4-6F175D3DCCD1}">
-              <a14:hiddenFill xmlns:a14="http://schemas.microsoft.com/office/drawing/2010/main" xmlns="">
+              <a14:hiddenFill xmlns="" xmlns:a14="http://schemas.microsoft.com/office/drawing/2010/main">
                 <a:solidFill>
                   <a:srgbClr val="FFFFFF"/>
                 </a:solidFill>
@@ -36821,7 +37122,7 @@
           </a:ln>
           <a:extLst>
             <a:ext uri="{909E8E84-426E-40dd-AFC4-6F175D3DCCD1}">
-              <a14:hiddenFill xmlns:a14="http://schemas.microsoft.com/office/drawing/2010/main" xmlns="">
+              <a14:hiddenFill xmlns="" xmlns:a14="http://schemas.microsoft.com/office/drawing/2010/main">
                 <a:noFill/>
               </a14:hiddenFill>
             </a:ext>
@@ -36945,7 +37246,7 @@
             </a:ln>
             <a:extLst>
               <a:ext uri="{909E8E84-426E-40dd-AFC4-6F175D3DCCD1}">
-                <a14:hiddenFill xmlns:a14="http://schemas.microsoft.com/office/drawing/2010/main" xmlns="">
+                <a14:hiddenFill xmlns="" xmlns:a14="http://schemas.microsoft.com/office/drawing/2010/main">
                   <a:solidFill>
                     <a:srgbClr val="FFFFFF"/>
                   </a:solidFill>
@@ -37124,7 +37425,7 @@
             </a:ln>
             <a:extLst>
               <a:ext uri="{909E8E84-426E-40dd-AFC4-6F175D3DCCD1}">
-                <a14:hiddenFill xmlns:a14="http://schemas.microsoft.com/office/drawing/2010/main" xmlns="">
+                <a14:hiddenFill xmlns="" xmlns:a14="http://schemas.microsoft.com/office/drawing/2010/main">
                   <a:solidFill>
                     <a:srgbClr val="FFFFFF"/>
                   </a:solidFill>
@@ -37167,7 +37468,7 @@
             </a:ln>
             <a:extLst>
               <a:ext uri="{909E8E84-426E-40dd-AFC4-6F175D3DCCD1}">
-                <a14:hiddenFill xmlns:a14="http://schemas.microsoft.com/office/drawing/2010/main" xmlns="">
+                <a14:hiddenFill xmlns="" xmlns:a14="http://schemas.microsoft.com/office/drawing/2010/main">
                   <a:noFill/>
                 </a14:hiddenFill>
               </a:ext>
@@ -37208,7 +37509,7 @@
             </a:ln>
             <a:extLst>
               <a:ext uri="{909E8E84-426E-40dd-AFC4-6F175D3DCCD1}">
-                <a14:hiddenFill xmlns:a14="http://schemas.microsoft.com/office/drawing/2010/main" xmlns="">
+                <a14:hiddenFill xmlns="" xmlns:a14="http://schemas.microsoft.com/office/drawing/2010/main">
                   <a:noFill/>
                 </a14:hiddenFill>
               </a:ext>
@@ -37266,7 +37567,7 @@
             </a:ln>
             <a:extLst>
               <a:ext uri="{909E8E84-426E-40dd-AFC4-6F175D3DCCD1}">
-                <a14:hiddenFill xmlns:a14="http://schemas.microsoft.com/office/drawing/2010/main" xmlns="">
+                <a14:hiddenFill xmlns="" xmlns:a14="http://schemas.microsoft.com/office/drawing/2010/main">
                   <a:noFill/>
                 </a14:hiddenFill>
               </a:ext>
@@ -37302,14 +37603,14 @@
             </a:ln>
             <a:extLst>
               <a:ext uri="{909E8E84-426E-40dd-AFC4-6F175D3DCCD1}">
-                <a14:hiddenFill xmlns:a14="http://schemas.microsoft.com/office/drawing/2010/main" xmlns="">
+                <a14:hiddenFill xmlns="" xmlns:a14="http://schemas.microsoft.com/office/drawing/2010/main">
                   <a:solidFill>
                     <a:srgbClr val="FFFFFF"/>
                   </a:solidFill>
                 </a14:hiddenFill>
               </a:ext>
               <a:ext uri="{91240B29-F687-4f45-9708-019B960494DF}">
-                <a14:hiddenLine xmlns:a14="http://schemas.microsoft.com/office/drawing/2010/main" xmlns="" w="38100">
+                <a14:hiddenLine xmlns="" xmlns:a14="http://schemas.microsoft.com/office/drawing/2010/main" w="38100">
                   <a:solidFill>
                     <a:srgbClr val="000000"/>
                   </a:solidFill>
@@ -37470,7 +37771,7 @@
             </a:ln>
             <a:extLst>
               <a:ext uri="{909E8E84-426E-40dd-AFC4-6F175D3DCCD1}">
-                <a14:hiddenFill xmlns:a14="http://schemas.microsoft.com/office/drawing/2010/main" xmlns="">
+                <a14:hiddenFill xmlns="" xmlns:a14="http://schemas.microsoft.com/office/drawing/2010/main">
                   <a:noFill/>
                 </a14:hiddenFill>
               </a:ext>
@@ -37523,14 +37824,14 @@
             </a:ln>
             <a:extLst>
               <a:ext uri="{909E8E84-426E-40dd-AFC4-6F175D3DCCD1}">
-                <a14:hiddenFill xmlns:a14="http://schemas.microsoft.com/office/drawing/2010/main" xmlns="">
+                <a14:hiddenFill xmlns="" xmlns:a14="http://schemas.microsoft.com/office/drawing/2010/main">
                   <a:solidFill>
                     <a:srgbClr val="FFFFFF"/>
                   </a:solidFill>
                 </a14:hiddenFill>
               </a:ext>
               <a:ext uri="{91240B29-F687-4f45-9708-019B960494DF}">
-                <a14:hiddenLine xmlns:a14="http://schemas.microsoft.com/office/drawing/2010/main" xmlns="" w="38100">
+                <a14:hiddenLine xmlns="" xmlns:a14="http://schemas.microsoft.com/office/drawing/2010/main" w="38100">
                   <a:solidFill>
                     <a:srgbClr val="000000"/>
                   </a:solidFill>
@@ -37693,7 +37994,7 @@
             </a:ln>
             <a:extLst>
               <a:ext uri="{909E8E84-426E-40dd-AFC4-6F175D3DCCD1}">
-                <a14:hiddenFill xmlns:a14="http://schemas.microsoft.com/office/drawing/2010/main" xmlns="">
+                <a14:hiddenFill xmlns="" xmlns:a14="http://schemas.microsoft.com/office/drawing/2010/main">
                   <a:noFill/>
                 </a14:hiddenFill>
               </a:ext>
@@ -37729,7 +38030,7 @@
             </a:ln>
             <a:extLst>
               <a:ext uri="{909E8E84-426E-40dd-AFC4-6F175D3DCCD1}">
-                <a14:hiddenFill xmlns:a14="http://schemas.microsoft.com/office/drawing/2010/main" xmlns="">
+                <a14:hiddenFill xmlns="" xmlns:a14="http://schemas.microsoft.com/office/drawing/2010/main">
                   <a:noFill/>
                 </a14:hiddenFill>
               </a:ext>
@@ -37780,7 +38081,7 @@
             </a:ln>
             <a:extLst>
               <a:ext uri="{909E8E84-426E-40dd-AFC4-6F175D3DCCD1}">
-                <a14:hiddenFill xmlns:a14="http://schemas.microsoft.com/office/drawing/2010/main" xmlns="">
+                <a14:hiddenFill xmlns="" xmlns:a14="http://schemas.microsoft.com/office/drawing/2010/main">
                   <a:noFill/>
                 </a14:hiddenFill>
               </a:ext>
@@ -37816,14 +38117,14 @@
             </a:ln>
             <a:extLst>
               <a:ext uri="{909E8E84-426E-40dd-AFC4-6F175D3DCCD1}">
-                <a14:hiddenFill xmlns:a14="http://schemas.microsoft.com/office/drawing/2010/main" xmlns="">
+                <a14:hiddenFill xmlns="" xmlns:a14="http://schemas.microsoft.com/office/drawing/2010/main">
                   <a:solidFill>
                     <a:srgbClr val="FFFFFF"/>
                   </a:solidFill>
                 </a14:hiddenFill>
               </a:ext>
               <a:ext uri="{91240B29-F687-4f45-9708-019B960494DF}">
-                <a14:hiddenLine xmlns:a14="http://schemas.microsoft.com/office/drawing/2010/main" xmlns="" w="38100">
+                <a14:hiddenLine xmlns="" xmlns:a14="http://schemas.microsoft.com/office/drawing/2010/main" w="38100">
                   <a:solidFill>
                     <a:srgbClr val="000000"/>
                   </a:solidFill>

</xml_diff>